<commit_message>
updated with course overview
</commit_message>
<xml_diff>
--- a/Lesson 1/Section 1/Software Development Lifecyle.pptx
+++ b/Lesson 1/Section 1/Software Development Lifecyle.pptx
@@ -6,7 +6,7 @@
     <p:sldMasterId id="2147483661" r:id="rId2"/>
   </p:sldMasterIdLst>
   <p:notesMasterIdLst>
-    <p:notesMasterId r:id="rId11"/>
+    <p:notesMasterId r:id="rId12"/>
   </p:notesMasterIdLst>
   <p:sldIdLst>
     <p:sldId id="256" r:id="rId3"/>
@@ -17,6 +17,7 @@
     <p:sldId id="257" r:id="rId8"/>
     <p:sldId id="258" r:id="rId9"/>
     <p:sldId id="259" r:id="rId10"/>
+    <p:sldId id="264" r:id="rId11"/>
   </p:sldIdLst>
   <p:sldSz cx="12192000" cy="6858000"/>
   <p:notesSz cx="6858000" cy="9144000"/>
@@ -1615,7 +1616,7 @@
               <a:t>share&amp;utm_medium</a:t>
             </a:r>
             <a:r>
-              <a:rPr lang="en-US"/>
+              <a:rPr lang="en-US" dirty="0"/>
               <a:t>=copy</a:t>
             </a:r>
             <a:endParaRPr kumimoji="0" lang="en-US" sz="1200" b="0" i="0" u="none" strike="noStrike" kern="0" cap="none" spc="0" normalizeH="0" baseline="0" noProof="0" dirty="0">
@@ -3118,6 +3119,339 @@
 </p:notes>
 </file>
 
+<file path=ppt/notesSlides/notesSlide6.xml><?xml version="1.0" encoding="utf-8"?>
+<p:notes xmlns:a="http://schemas.openxmlformats.org/drawingml/2006/main" xmlns:r="http://schemas.openxmlformats.org/officeDocument/2006/relationships" xmlns:p="http://schemas.openxmlformats.org/presentationml/2006/main" showMasterSp="0" showMasterPhAnim="0">
+  <p:cSld>
+    <p:spTree>
+      <p:nvGrpSpPr>
+        <p:cNvPr id="1" name="Shape 117"/>
+        <p:cNvGrpSpPr/>
+        <p:nvPr/>
+      </p:nvGrpSpPr>
+      <p:grpSpPr>
+        <a:xfrm>
+          <a:off x="0" y="0"/>
+          <a:ext cx="0" cy="0"/>
+          <a:chOff x="0" y="0"/>
+          <a:chExt cx="0" cy="0"/>
+        </a:xfrm>
+      </p:grpSpPr>
+      <p:sp>
+        <p:nvSpPr>
+          <p:cNvPr id="118" name="Google Shape;118;p3:notes"/>
+          <p:cNvSpPr>
+            <a:spLocks noGrp="1" noRot="1" noChangeAspect="1"/>
+          </p:cNvSpPr>
+          <p:nvPr>
+            <p:ph type="sldImg" idx="2"/>
+          </p:nvPr>
+        </p:nvSpPr>
+        <p:spPr>
+          <a:xfrm>
+            <a:off x="685800" y="1143000"/>
+            <a:ext cx="5486400" cy="3086100"/>
+          </a:xfrm>
+          <a:custGeom>
+            <a:avLst/>
+            <a:gdLst/>
+            <a:ahLst/>
+            <a:cxnLst/>
+            <a:rect l="l" t="t" r="r" b="b"/>
+            <a:pathLst>
+              <a:path w="120000" h="120000" extrusionOk="0">
+                <a:moveTo>
+                  <a:pt x="0" y="0"/>
+                </a:moveTo>
+                <a:lnTo>
+                  <a:pt x="120000" y="0"/>
+                </a:lnTo>
+                <a:lnTo>
+                  <a:pt x="120000" y="120000"/>
+                </a:lnTo>
+                <a:lnTo>
+                  <a:pt x="0" y="120000"/>
+                </a:lnTo>
+                <a:close/>
+              </a:path>
+            </a:pathLst>
+          </a:custGeom>
+          <a:noFill/>
+          <a:ln w="12700" cap="flat" cmpd="sng">
+            <a:solidFill>
+              <a:srgbClr val="000000"/>
+            </a:solidFill>
+            <a:prstDash val="solid"/>
+            <a:round/>
+            <a:headEnd type="none" w="sm" len="sm"/>
+            <a:tailEnd type="none" w="sm" len="sm"/>
+          </a:ln>
+        </p:spPr>
+      </p:sp>
+      <p:sp>
+        <p:nvSpPr>
+          <p:cNvPr id="119" name="Google Shape;119;p3:notes"/>
+          <p:cNvSpPr txBox="1">
+            <a:spLocks noGrp="1"/>
+          </p:cNvSpPr>
+          <p:nvPr>
+            <p:ph type="body" idx="1"/>
+          </p:nvPr>
+        </p:nvSpPr>
+        <p:spPr>
+          <a:xfrm>
+            <a:off x="685800" y="4400550"/>
+            <a:ext cx="5486400" cy="3600450"/>
+          </a:xfrm>
+          <a:prstGeom prst="rect">
+            <a:avLst/>
+          </a:prstGeom>
+          <a:noFill/>
+          <a:ln>
+            <a:noFill/>
+          </a:ln>
+        </p:spPr>
+        <p:txBody>
+          <a:bodyPr spcFirstLastPara="1" wrap="square" lIns="91425" tIns="45700" rIns="91425" bIns="45700" anchor="t" anchorCtr="0">
+            <a:noAutofit/>
+          </a:bodyPr>
+          <a:lstStyle/>
+          <a:p>
+            <a:pPr marL="0" marR="0" lvl="0" indent="0" algn="l" rtl="0">
+              <a:spcBef>
+                <a:spcPts val="0"/>
+              </a:spcBef>
+              <a:spcAft>
+                <a:spcPts val="0"/>
+              </a:spcAft>
+              <a:buNone/>
+            </a:pPr>
+            <a:r>
+              <a:rPr lang="en-US" sz="1200" b="0" i="0" u="none" strike="noStrike" cap="none" dirty="0">
+                <a:solidFill>
+                  <a:schemeClr val="dk1"/>
+                </a:solidFill>
+                <a:latin typeface="Calibri"/>
+                <a:ea typeface="Calibri"/>
+                <a:cs typeface="Calibri"/>
+                <a:sym typeface="Calibri"/>
+              </a:rPr>
+              <a:t>We are following the material from the book “App Development with swift”</a:t>
+            </a:r>
+          </a:p>
+          <a:p>
+            <a:pPr marL="0" marR="0" lvl="0" indent="0" algn="l" rtl="0">
+              <a:spcBef>
+                <a:spcPts val="0"/>
+              </a:spcBef>
+              <a:spcAft>
+                <a:spcPts val="0"/>
+              </a:spcAft>
+              <a:buNone/>
+            </a:pPr>
+            <a:endParaRPr lang="en-US" sz="1200" b="0" i="0" u="none" strike="noStrike" cap="none" dirty="0">
+              <a:solidFill>
+                <a:schemeClr val="dk1"/>
+              </a:solidFill>
+              <a:latin typeface="Calibri"/>
+              <a:ea typeface="Calibri"/>
+              <a:cs typeface="Calibri"/>
+              <a:sym typeface="Calibri"/>
+            </a:endParaRPr>
+          </a:p>
+          <a:p>
+            <a:pPr marL="0" marR="0" lvl="0" indent="0" algn="l" rtl="0">
+              <a:spcBef>
+                <a:spcPts val="0"/>
+              </a:spcBef>
+              <a:spcAft>
+                <a:spcPts val="0"/>
+              </a:spcAft>
+              <a:buNone/>
+            </a:pPr>
+            <a:endParaRPr lang="en-US" sz="1200" b="0" i="0" u="none" strike="noStrike" cap="none" dirty="0">
+              <a:solidFill>
+                <a:schemeClr val="dk1"/>
+              </a:solidFill>
+              <a:latin typeface="Calibri"/>
+              <a:ea typeface="Calibri"/>
+              <a:cs typeface="Calibri"/>
+              <a:sym typeface="Calibri"/>
+            </a:endParaRPr>
+          </a:p>
+          <a:p>
+            <a:pPr marL="0" marR="0" lvl="0" indent="0" algn="l" rtl="0">
+              <a:spcBef>
+                <a:spcPts val="0"/>
+              </a:spcBef>
+              <a:spcAft>
+                <a:spcPts val="0"/>
+              </a:spcAft>
+              <a:buNone/>
+            </a:pPr>
+            <a:r>
+              <a:rPr lang="en-NZ" sz="1200" b="0" i="0" u="none" strike="noStrike" cap="none" dirty="0">
+                <a:solidFill>
+                  <a:schemeClr val="dk1"/>
+                </a:solidFill>
+                <a:latin typeface="Calibri"/>
+                <a:ea typeface="Calibri"/>
+                <a:cs typeface="Calibri"/>
+                <a:sym typeface="Calibri"/>
+              </a:rPr>
+              <a:t>Used some programming before, but we will cover a lot of the basics at the start as a refresher. </a:t>
+            </a:r>
+          </a:p>
+          <a:p>
+            <a:pPr marL="0" marR="0" lvl="0" indent="0" algn="l" rtl="0">
+              <a:spcBef>
+                <a:spcPts val="0"/>
+              </a:spcBef>
+              <a:spcAft>
+                <a:spcPts val="0"/>
+              </a:spcAft>
+              <a:buNone/>
+            </a:pPr>
+            <a:br>
+              <a:rPr lang="en-NZ" sz="1200" b="0" i="0" u="none" strike="noStrike" cap="none" dirty="0">
+                <a:solidFill>
+                  <a:schemeClr val="dk1"/>
+                </a:solidFill>
+                <a:latin typeface="Calibri"/>
+                <a:ea typeface="Calibri"/>
+                <a:cs typeface="Calibri"/>
+                <a:sym typeface="Calibri"/>
+              </a:rPr>
+            </a:br>
+            <a:endParaRPr lang="en-NZ" sz="1200" b="0" i="0" u="none" strike="noStrike" cap="none" dirty="0">
+              <a:solidFill>
+                <a:schemeClr val="dk1"/>
+              </a:solidFill>
+              <a:latin typeface="Calibri"/>
+              <a:ea typeface="Calibri"/>
+              <a:cs typeface="Calibri"/>
+              <a:sym typeface="Calibri"/>
+            </a:endParaRPr>
+          </a:p>
+          <a:p>
+            <a:pPr marL="0" marR="0" lvl="0" indent="0" algn="l" rtl="0">
+              <a:spcBef>
+                <a:spcPts val="0"/>
+              </a:spcBef>
+              <a:spcAft>
+                <a:spcPts val="0"/>
+              </a:spcAft>
+              <a:buNone/>
+            </a:pPr>
+            <a:r>
+              <a:rPr lang="en-NZ" sz="1200" b="0" i="0" u="none" strike="noStrike" cap="none" dirty="0">
+                <a:solidFill>
+                  <a:schemeClr val="dk1"/>
+                </a:solidFill>
+                <a:latin typeface="Calibri"/>
+                <a:ea typeface="Calibri"/>
+                <a:cs typeface="Calibri"/>
+                <a:sym typeface="Calibri"/>
+              </a:rPr>
+              <a:t>Reading the theory from book, we cover it in a more practical sense </a:t>
+            </a:r>
+          </a:p>
+          <a:p>
+            <a:pPr marL="0" marR="0" lvl="0" indent="0" algn="l" rtl="0">
+              <a:spcBef>
+                <a:spcPts val="0"/>
+              </a:spcBef>
+              <a:spcAft>
+                <a:spcPts val="0"/>
+              </a:spcAft>
+              <a:buNone/>
+            </a:pPr>
+            <a:endParaRPr sz="1200" b="0" i="0" u="none" strike="noStrike" cap="none" dirty="0">
+              <a:solidFill>
+                <a:schemeClr val="dk1"/>
+              </a:solidFill>
+              <a:latin typeface="Calibri"/>
+              <a:ea typeface="Calibri"/>
+              <a:cs typeface="Calibri"/>
+              <a:sym typeface="Calibri"/>
+            </a:endParaRPr>
+          </a:p>
+        </p:txBody>
+      </p:sp>
+      <p:sp>
+        <p:nvSpPr>
+          <p:cNvPr id="120" name="Google Shape;120;p3:notes"/>
+          <p:cNvSpPr txBox="1">
+            <a:spLocks noGrp="1"/>
+          </p:cNvSpPr>
+          <p:nvPr>
+            <p:ph type="sldNum" idx="12"/>
+          </p:nvPr>
+        </p:nvSpPr>
+        <p:spPr>
+          <a:xfrm>
+            <a:off x="3884613" y="8685213"/>
+            <a:ext cx="2971800" cy="458787"/>
+          </a:xfrm>
+          <a:prstGeom prst="rect">
+            <a:avLst/>
+          </a:prstGeom>
+          <a:noFill/>
+          <a:ln>
+            <a:noFill/>
+          </a:ln>
+        </p:spPr>
+        <p:txBody>
+          <a:bodyPr spcFirstLastPara="1" wrap="square" lIns="91425" tIns="45700" rIns="91425" bIns="45700" anchor="b" anchorCtr="0">
+            <a:noAutofit/>
+          </a:bodyPr>
+          <a:lstStyle/>
+          <a:p>
+            <a:pPr marL="0" marR="0" lvl="0" indent="0" algn="r" rtl="0">
+              <a:spcBef>
+                <a:spcPts val="0"/>
+              </a:spcBef>
+              <a:spcAft>
+                <a:spcPts val="0"/>
+              </a:spcAft>
+              <a:buNone/>
+            </a:pPr>
+            <a:fld id="{00000000-1234-1234-1234-123412341234}" type="slidenum">
+              <a:rPr lang="en-US" sz="1200" b="0" i="0" u="none" strike="noStrike" cap="none">
+                <a:solidFill>
+                  <a:schemeClr val="dk1"/>
+                </a:solidFill>
+                <a:latin typeface="Calibri"/>
+                <a:ea typeface="Calibri"/>
+                <a:cs typeface="Calibri"/>
+                <a:sym typeface="Calibri"/>
+              </a:rPr>
+              <a:t>9</a:t>
+            </a:fld>
+            <a:endParaRPr sz="1200" b="0" i="0" u="none" strike="noStrike" cap="none">
+              <a:solidFill>
+                <a:schemeClr val="dk1"/>
+              </a:solidFill>
+              <a:latin typeface="Calibri"/>
+              <a:ea typeface="Calibri"/>
+              <a:cs typeface="Calibri"/>
+              <a:sym typeface="Calibri"/>
+            </a:endParaRPr>
+          </a:p>
+        </p:txBody>
+      </p:sp>
+    </p:spTree>
+    <p:extLst>
+      <p:ext uri="{BB962C8B-B14F-4D97-AF65-F5344CB8AC3E}">
+        <p14:creationId xmlns:p14="http://schemas.microsoft.com/office/powerpoint/2010/main" val="2813182458"/>
+      </p:ext>
+    </p:extLst>
+  </p:cSld>
+  <p:clrMapOvr>
+    <a:masterClrMapping/>
+  </p:clrMapOvr>
+</p:notes>
+</file>
+
 <file path=ppt/slideLayouts/slideLayout1.xml><?xml version="1.0" encoding="utf-8"?>
 <p:sldLayout xmlns:a="http://schemas.openxmlformats.org/drawingml/2006/main" xmlns:r="http://schemas.openxmlformats.org/officeDocument/2006/relationships" xmlns:p="http://schemas.openxmlformats.org/presentationml/2006/main" matchingName="Title and Content" type="obj">
   <p:cSld name="OBJECT">
@@ -4144,1031 +4478,6 @@
 </file>
 
 <file path=ppt/slideLayouts/slideLayout10.xml><?xml version="1.0" encoding="utf-8"?>
-<p:sldLayout xmlns:a="http://schemas.openxmlformats.org/drawingml/2006/main" xmlns:r="http://schemas.openxmlformats.org/officeDocument/2006/relationships" xmlns:p="http://schemas.openxmlformats.org/presentationml/2006/main" matchingName="Title and Vertical Text" type="vertTx">
-  <p:cSld name="VERTICAL_TEXT">
-    <p:spTree>
-      <p:nvGrpSpPr>
-        <p:cNvPr id="1" name="Shape 84"/>
-        <p:cNvGrpSpPr/>
-        <p:nvPr/>
-      </p:nvGrpSpPr>
-      <p:grpSpPr>
-        <a:xfrm>
-          <a:off x="0" y="0"/>
-          <a:ext cx="0" cy="0"/>
-          <a:chOff x="0" y="0"/>
-          <a:chExt cx="0" cy="0"/>
-        </a:xfrm>
-      </p:grpSpPr>
-      <p:sp>
-        <p:nvSpPr>
-          <p:cNvPr id="85" name="Google Shape;85;p13"/>
-          <p:cNvSpPr txBox="1">
-            <a:spLocks noGrp="1"/>
-          </p:cNvSpPr>
-          <p:nvPr>
-            <p:ph type="title"/>
-          </p:nvPr>
-        </p:nvSpPr>
-        <p:spPr>
-          <a:xfrm>
-            <a:off x="838200" y="365125"/>
-            <a:ext cx="10515600" cy="1325700"/>
-          </a:xfrm>
-          <a:prstGeom prst="rect">
-            <a:avLst/>
-          </a:prstGeom>
-          <a:noFill/>
-          <a:ln>
-            <a:noFill/>
-          </a:ln>
-        </p:spPr>
-        <p:txBody>
-          <a:bodyPr spcFirstLastPara="1" wrap="square" lIns="91425" tIns="45700" rIns="91425" bIns="45700" anchor="ctr" anchorCtr="0"/>
-          <a:lstStyle>
-            <a:lvl1pPr marR="0" lvl="0" algn="l" rtl="0">
-              <a:lnSpc>
-                <a:spcPct val="90000"/>
-              </a:lnSpc>
-              <a:spcBef>
-                <a:spcPts val="0"/>
-              </a:spcBef>
-              <a:spcAft>
-                <a:spcPts val="0"/>
-              </a:spcAft>
-              <a:buClr>
-                <a:schemeClr val="dk1"/>
-              </a:buClr>
-              <a:buSzPts val="4400"/>
-              <a:buFont typeface="Calibri"/>
-              <a:buNone/>
-              <a:defRPr sz="4400" b="0" i="0" u="none" strike="noStrike" cap="none">
-                <a:solidFill>
-                  <a:schemeClr val="dk1"/>
-                </a:solidFill>
-                <a:latin typeface="Calibri"/>
-                <a:ea typeface="Calibri"/>
-                <a:cs typeface="Calibri"/>
-                <a:sym typeface="Calibri"/>
-              </a:defRPr>
-            </a:lvl1pPr>
-            <a:lvl2pPr lvl="1" rtl="0">
-              <a:spcBef>
-                <a:spcPts val="0"/>
-              </a:spcBef>
-              <a:spcAft>
-                <a:spcPts val="0"/>
-              </a:spcAft>
-              <a:buSzPts val="1400"/>
-              <a:buNone/>
-              <a:defRPr sz="1800"/>
-            </a:lvl2pPr>
-            <a:lvl3pPr lvl="2" rtl="0">
-              <a:spcBef>
-                <a:spcPts val="0"/>
-              </a:spcBef>
-              <a:spcAft>
-                <a:spcPts val="0"/>
-              </a:spcAft>
-              <a:buSzPts val="1400"/>
-              <a:buNone/>
-              <a:defRPr sz="1800"/>
-            </a:lvl3pPr>
-            <a:lvl4pPr lvl="3" rtl="0">
-              <a:spcBef>
-                <a:spcPts val="0"/>
-              </a:spcBef>
-              <a:spcAft>
-                <a:spcPts val="0"/>
-              </a:spcAft>
-              <a:buSzPts val="1400"/>
-              <a:buNone/>
-              <a:defRPr sz="1800"/>
-            </a:lvl4pPr>
-            <a:lvl5pPr lvl="4" rtl="0">
-              <a:spcBef>
-                <a:spcPts val="0"/>
-              </a:spcBef>
-              <a:spcAft>
-                <a:spcPts val="0"/>
-              </a:spcAft>
-              <a:buSzPts val="1400"/>
-              <a:buNone/>
-              <a:defRPr sz="1800"/>
-            </a:lvl5pPr>
-            <a:lvl6pPr lvl="5" rtl="0">
-              <a:spcBef>
-                <a:spcPts val="0"/>
-              </a:spcBef>
-              <a:spcAft>
-                <a:spcPts val="0"/>
-              </a:spcAft>
-              <a:buSzPts val="1400"/>
-              <a:buNone/>
-              <a:defRPr sz="1800"/>
-            </a:lvl6pPr>
-            <a:lvl7pPr lvl="6" rtl="0">
-              <a:spcBef>
-                <a:spcPts val="0"/>
-              </a:spcBef>
-              <a:spcAft>
-                <a:spcPts val="0"/>
-              </a:spcAft>
-              <a:buSzPts val="1400"/>
-              <a:buNone/>
-              <a:defRPr sz="1800"/>
-            </a:lvl7pPr>
-            <a:lvl8pPr lvl="7" rtl="0">
-              <a:spcBef>
-                <a:spcPts val="0"/>
-              </a:spcBef>
-              <a:spcAft>
-                <a:spcPts val="0"/>
-              </a:spcAft>
-              <a:buSzPts val="1400"/>
-              <a:buNone/>
-              <a:defRPr sz="1800"/>
-            </a:lvl8pPr>
-            <a:lvl9pPr lvl="8" rtl="0">
-              <a:spcBef>
-                <a:spcPts val="0"/>
-              </a:spcBef>
-              <a:spcAft>
-                <a:spcPts val="0"/>
-              </a:spcAft>
-              <a:buSzPts val="1400"/>
-              <a:buNone/>
-              <a:defRPr sz="1800"/>
-            </a:lvl9pPr>
-          </a:lstStyle>
-          <a:p>
-            <a:endParaRPr/>
-          </a:p>
-        </p:txBody>
-      </p:sp>
-      <p:sp>
-        <p:nvSpPr>
-          <p:cNvPr id="86" name="Google Shape;86;p13"/>
-          <p:cNvSpPr txBox="1">
-            <a:spLocks noGrp="1"/>
-          </p:cNvSpPr>
-          <p:nvPr>
-            <p:ph type="body" idx="1"/>
-          </p:nvPr>
-        </p:nvSpPr>
-        <p:spPr>
-          <a:xfrm rot="5400000">
-            <a:off x="3920400" y="-1256575"/>
-            <a:ext cx="4351200" cy="10515600"/>
-          </a:xfrm>
-          <a:prstGeom prst="rect">
-            <a:avLst/>
-          </a:prstGeom>
-          <a:noFill/>
-          <a:ln>
-            <a:noFill/>
-          </a:ln>
-        </p:spPr>
-        <p:txBody>
-          <a:bodyPr spcFirstLastPara="1" wrap="square" lIns="91425" tIns="45700" rIns="91425" bIns="45700" anchor="t" anchorCtr="0"/>
-          <a:lstStyle>
-            <a:lvl1pPr marL="457200" marR="0" lvl="0" indent="-406400" algn="l" rtl="0">
-              <a:lnSpc>
-                <a:spcPct val="90000"/>
-              </a:lnSpc>
-              <a:spcBef>
-                <a:spcPts val="1000"/>
-              </a:spcBef>
-              <a:spcAft>
-                <a:spcPts val="0"/>
-              </a:spcAft>
-              <a:buClr>
-                <a:schemeClr val="dk1"/>
-              </a:buClr>
-              <a:buSzPts val="2800"/>
-              <a:buFont typeface="Arial"/>
-              <a:buChar char="•"/>
-              <a:defRPr sz="2800" b="0" i="0" u="none" strike="noStrike" cap="none">
-                <a:solidFill>
-                  <a:schemeClr val="dk1"/>
-                </a:solidFill>
-                <a:latin typeface="Calibri"/>
-                <a:ea typeface="Calibri"/>
-                <a:cs typeface="Calibri"/>
-                <a:sym typeface="Calibri"/>
-              </a:defRPr>
-            </a:lvl1pPr>
-            <a:lvl2pPr marL="914400" marR="0" lvl="1" indent="-381000" algn="l" rtl="0">
-              <a:lnSpc>
-                <a:spcPct val="90000"/>
-              </a:lnSpc>
-              <a:spcBef>
-                <a:spcPts val="500"/>
-              </a:spcBef>
-              <a:spcAft>
-                <a:spcPts val="0"/>
-              </a:spcAft>
-              <a:buClr>
-                <a:schemeClr val="dk1"/>
-              </a:buClr>
-              <a:buSzPts val="2400"/>
-              <a:buFont typeface="Arial"/>
-              <a:buChar char="•"/>
-              <a:defRPr sz="2400" b="0" i="0" u="none" strike="noStrike" cap="none">
-                <a:solidFill>
-                  <a:schemeClr val="dk1"/>
-                </a:solidFill>
-                <a:latin typeface="Calibri"/>
-                <a:ea typeface="Calibri"/>
-                <a:cs typeface="Calibri"/>
-                <a:sym typeface="Calibri"/>
-              </a:defRPr>
-            </a:lvl2pPr>
-            <a:lvl3pPr marL="1371600" marR="0" lvl="2" indent="-355600" algn="l" rtl="0">
-              <a:lnSpc>
-                <a:spcPct val="90000"/>
-              </a:lnSpc>
-              <a:spcBef>
-                <a:spcPts val="500"/>
-              </a:spcBef>
-              <a:spcAft>
-                <a:spcPts val="0"/>
-              </a:spcAft>
-              <a:buClr>
-                <a:schemeClr val="dk1"/>
-              </a:buClr>
-              <a:buSzPts val="2000"/>
-              <a:buFont typeface="Arial"/>
-              <a:buChar char="•"/>
-              <a:defRPr sz="2000" b="0" i="0" u="none" strike="noStrike" cap="none">
-                <a:solidFill>
-                  <a:schemeClr val="dk1"/>
-                </a:solidFill>
-                <a:latin typeface="Calibri"/>
-                <a:ea typeface="Calibri"/>
-                <a:cs typeface="Calibri"/>
-                <a:sym typeface="Calibri"/>
-              </a:defRPr>
-            </a:lvl3pPr>
-            <a:lvl4pPr marL="1828800" marR="0" lvl="3" indent="-342900" algn="l" rtl="0">
-              <a:lnSpc>
-                <a:spcPct val="90000"/>
-              </a:lnSpc>
-              <a:spcBef>
-                <a:spcPts val="500"/>
-              </a:spcBef>
-              <a:spcAft>
-                <a:spcPts val="0"/>
-              </a:spcAft>
-              <a:buClr>
-                <a:schemeClr val="dk1"/>
-              </a:buClr>
-              <a:buSzPts val="1800"/>
-              <a:buFont typeface="Arial"/>
-              <a:buChar char="•"/>
-              <a:defRPr sz="1800" b="0" i="0" u="none" strike="noStrike" cap="none">
-                <a:solidFill>
-                  <a:schemeClr val="dk1"/>
-                </a:solidFill>
-                <a:latin typeface="Calibri"/>
-                <a:ea typeface="Calibri"/>
-                <a:cs typeface="Calibri"/>
-                <a:sym typeface="Calibri"/>
-              </a:defRPr>
-            </a:lvl4pPr>
-            <a:lvl5pPr marL="2286000" marR="0" lvl="4" indent="-342900" algn="l" rtl="0">
-              <a:lnSpc>
-                <a:spcPct val="90000"/>
-              </a:lnSpc>
-              <a:spcBef>
-                <a:spcPts val="500"/>
-              </a:spcBef>
-              <a:spcAft>
-                <a:spcPts val="0"/>
-              </a:spcAft>
-              <a:buClr>
-                <a:schemeClr val="dk1"/>
-              </a:buClr>
-              <a:buSzPts val="1800"/>
-              <a:buFont typeface="Arial"/>
-              <a:buChar char="•"/>
-              <a:defRPr sz="1800" b="0" i="0" u="none" strike="noStrike" cap="none">
-                <a:solidFill>
-                  <a:schemeClr val="dk1"/>
-                </a:solidFill>
-                <a:latin typeface="Calibri"/>
-                <a:ea typeface="Calibri"/>
-                <a:cs typeface="Calibri"/>
-                <a:sym typeface="Calibri"/>
-              </a:defRPr>
-            </a:lvl5pPr>
-            <a:lvl6pPr marL="2743200" marR="0" lvl="5" indent="-342900" algn="l" rtl="0">
-              <a:lnSpc>
-                <a:spcPct val="90000"/>
-              </a:lnSpc>
-              <a:spcBef>
-                <a:spcPts val="500"/>
-              </a:spcBef>
-              <a:spcAft>
-                <a:spcPts val="0"/>
-              </a:spcAft>
-              <a:buClr>
-                <a:schemeClr val="dk1"/>
-              </a:buClr>
-              <a:buSzPts val="1800"/>
-              <a:buFont typeface="Arial"/>
-              <a:buChar char="•"/>
-              <a:defRPr sz="1800" b="0" i="0" u="none" strike="noStrike" cap="none">
-                <a:solidFill>
-                  <a:schemeClr val="dk1"/>
-                </a:solidFill>
-                <a:latin typeface="Calibri"/>
-                <a:ea typeface="Calibri"/>
-                <a:cs typeface="Calibri"/>
-                <a:sym typeface="Calibri"/>
-              </a:defRPr>
-            </a:lvl6pPr>
-            <a:lvl7pPr marL="3200400" marR="0" lvl="6" indent="-342900" algn="l" rtl="0">
-              <a:lnSpc>
-                <a:spcPct val="90000"/>
-              </a:lnSpc>
-              <a:spcBef>
-                <a:spcPts val="500"/>
-              </a:spcBef>
-              <a:spcAft>
-                <a:spcPts val="0"/>
-              </a:spcAft>
-              <a:buClr>
-                <a:schemeClr val="dk1"/>
-              </a:buClr>
-              <a:buSzPts val="1800"/>
-              <a:buFont typeface="Arial"/>
-              <a:buChar char="•"/>
-              <a:defRPr sz="1800" b="0" i="0" u="none" strike="noStrike" cap="none">
-                <a:solidFill>
-                  <a:schemeClr val="dk1"/>
-                </a:solidFill>
-                <a:latin typeface="Calibri"/>
-                <a:ea typeface="Calibri"/>
-                <a:cs typeface="Calibri"/>
-                <a:sym typeface="Calibri"/>
-              </a:defRPr>
-            </a:lvl7pPr>
-            <a:lvl8pPr marL="3657600" marR="0" lvl="7" indent="-342900" algn="l" rtl="0">
-              <a:lnSpc>
-                <a:spcPct val="90000"/>
-              </a:lnSpc>
-              <a:spcBef>
-                <a:spcPts val="500"/>
-              </a:spcBef>
-              <a:spcAft>
-                <a:spcPts val="0"/>
-              </a:spcAft>
-              <a:buClr>
-                <a:schemeClr val="dk1"/>
-              </a:buClr>
-              <a:buSzPts val="1800"/>
-              <a:buFont typeface="Arial"/>
-              <a:buChar char="•"/>
-              <a:defRPr sz="1800" b="0" i="0" u="none" strike="noStrike" cap="none">
-                <a:solidFill>
-                  <a:schemeClr val="dk1"/>
-                </a:solidFill>
-                <a:latin typeface="Calibri"/>
-                <a:ea typeface="Calibri"/>
-                <a:cs typeface="Calibri"/>
-                <a:sym typeface="Calibri"/>
-              </a:defRPr>
-            </a:lvl8pPr>
-            <a:lvl9pPr marL="4114800" marR="0" lvl="8" indent="-342900" algn="l" rtl="0">
-              <a:lnSpc>
-                <a:spcPct val="90000"/>
-              </a:lnSpc>
-              <a:spcBef>
-                <a:spcPts val="500"/>
-              </a:spcBef>
-              <a:spcAft>
-                <a:spcPts val="0"/>
-              </a:spcAft>
-              <a:buClr>
-                <a:schemeClr val="dk1"/>
-              </a:buClr>
-              <a:buSzPts val="1800"/>
-              <a:buFont typeface="Arial"/>
-              <a:buChar char="•"/>
-              <a:defRPr sz="1800" b="0" i="0" u="none" strike="noStrike" cap="none">
-                <a:solidFill>
-                  <a:schemeClr val="dk1"/>
-                </a:solidFill>
-                <a:latin typeface="Calibri"/>
-                <a:ea typeface="Calibri"/>
-                <a:cs typeface="Calibri"/>
-                <a:sym typeface="Calibri"/>
-              </a:defRPr>
-            </a:lvl9pPr>
-          </a:lstStyle>
-          <a:p>
-            <a:endParaRPr/>
-          </a:p>
-        </p:txBody>
-      </p:sp>
-      <p:sp>
-        <p:nvSpPr>
-          <p:cNvPr id="87" name="Google Shape;87;p13"/>
-          <p:cNvSpPr txBox="1">
-            <a:spLocks noGrp="1"/>
-          </p:cNvSpPr>
-          <p:nvPr>
-            <p:ph type="dt" idx="10"/>
-          </p:nvPr>
-        </p:nvSpPr>
-        <p:spPr>
-          <a:xfrm>
-            <a:off x="838200" y="6356350"/>
-            <a:ext cx="2743200" cy="365100"/>
-          </a:xfrm>
-          <a:prstGeom prst="rect">
-            <a:avLst/>
-          </a:prstGeom>
-          <a:noFill/>
-          <a:ln>
-            <a:noFill/>
-          </a:ln>
-        </p:spPr>
-        <p:txBody>
-          <a:bodyPr spcFirstLastPara="1" wrap="square" lIns="91425" tIns="45700" rIns="91425" bIns="45700" anchor="ctr" anchorCtr="0"/>
-          <a:lstStyle>
-            <a:lvl1pPr marR="0" lvl="0" algn="l" rtl="0">
-              <a:spcBef>
-                <a:spcPts val="0"/>
-              </a:spcBef>
-              <a:spcAft>
-                <a:spcPts val="0"/>
-              </a:spcAft>
-              <a:buSzPts val="1400"/>
-              <a:buNone/>
-              <a:defRPr sz="1200" b="0" i="0" u="none" strike="noStrike" cap="none">
-                <a:solidFill>
-                  <a:srgbClr val="888888"/>
-                </a:solidFill>
-                <a:latin typeface="Calibri"/>
-                <a:ea typeface="Calibri"/>
-                <a:cs typeface="Calibri"/>
-                <a:sym typeface="Calibri"/>
-              </a:defRPr>
-            </a:lvl1pPr>
-            <a:lvl2pPr marR="0" lvl="1" algn="l" rtl="0">
-              <a:spcBef>
-                <a:spcPts val="0"/>
-              </a:spcBef>
-              <a:spcAft>
-                <a:spcPts val="0"/>
-              </a:spcAft>
-              <a:buSzPts val="1400"/>
-              <a:buNone/>
-              <a:defRPr sz="1800" b="0" i="0" u="none" strike="noStrike" cap="none">
-                <a:solidFill>
-                  <a:schemeClr val="dk1"/>
-                </a:solidFill>
-                <a:latin typeface="Calibri"/>
-                <a:ea typeface="Calibri"/>
-                <a:cs typeface="Calibri"/>
-                <a:sym typeface="Calibri"/>
-              </a:defRPr>
-            </a:lvl2pPr>
-            <a:lvl3pPr marR="0" lvl="2" algn="l" rtl="0">
-              <a:spcBef>
-                <a:spcPts val="0"/>
-              </a:spcBef>
-              <a:spcAft>
-                <a:spcPts val="0"/>
-              </a:spcAft>
-              <a:buSzPts val="1400"/>
-              <a:buNone/>
-              <a:defRPr sz="1800" b="0" i="0" u="none" strike="noStrike" cap="none">
-                <a:solidFill>
-                  <a:schemeClr val="dk1"/>
-                </a:solidFill>
-                <a:latin typeface="Calibri"/>
-                <a:ea typeface="Calibri"/>
-                <a:cs typeface="Calibri"/>
-                <a:sym typeface="Calibri"/>
-              </a:defRPr>
-            </a:lvl3pPr>
-            <a:lvl4pPr marR="0" lvl="3" algn="l" rtl="0">
-              <a:spcBef>
-                <a:spcPts val="0"/>
-              </a:spcBef>
-              <a:spcAft>
-                <a:spcPts val="0"/>
-              </a:spcAft>
-              <a:buSzPts val="1400"/>
-              <a:buNone/>
-              <a:defRPr sz="1800" b="0" i="0" u="none" strike="noStrike" cap="none">
-                <a:solidFill>
-                  <a:schemeClr val="dk1"/>
-                </a:solidFill>
-                <a:latin typeface="Calibri"/>
-                <a:ea typeface="Calibri"/>
-                <a:cs typeface="Calibri"/>
-                <a:sym typeface="Calibri"/>
-              </a:defRPr>
-            </a:lvl4pPr>
-            <a:lvl5pPr marR="0" lvl="4" algn="l" rtl="0">
-              <a:spcBef>
-                <a:spcPts val="0"/>
-              </a:spcBef>
-              <a:spcAft>
-                <a:spcPts val="0"/>
-              </a:spcAft>
-              <a:buSzPts val="1400"/>
-              <a:buNone/>
-              <a:defRPr sz="1800" b="0" i="0" u="none" strike="noStrike" cap="none">
-                <a:solidFill>
-                  <a:schemeClr val="dk1"/>
-                </a:solidFill>
-                <a:latin typeface="Calibri"/>
-                <a:ea typeface="Calibri"/>
-                <a:cs typeface="Calibri"/>
-                <a:sym typeface="Calibri"/>
-              </a:defRPr>
-            </a:lvl5pPr>
-            <a:lvl6pPr marR="0" lvl="5" algn="l" rtl="0">
-              <a:spcBef>
-                <a:spcPts val="0"/>
-              </a:spcBef>
-              <a:spcAft>
-                <a:spcPts val="0"/>
-              </a:spcAft>
-              <a:buSzPts val="1400"/>
-              <a:buNone/>
-              <a:defRPr sz="1800" b="0" i="0" u="none" strike="noStrike" cap="none">
-                <a:solidFill>
-                  <a:schemeClr val="dk1"/>
-                </a:solidFill>
-                <a:latin typeface="Calibri"/>
-                <a:ea typeface="Calibri"/>
-                <a:cs typeface="Calibri"/>
-                <a:sym typeface="Calibri"/>
-              </a:defRPr>
-            </a:lvl6pPr>
-            <a:lvl7pPr marR="0" lvl="6" algn="l" rtl="0">
-              <a:spcBef>
-                <a:spcPts val="0"/>
-              </a:spcBef>
-              <a:spcAft>
-                <a:spcPts val="0"/>
-              </a:spcAft>
-              <a:buSzPts val="1400"/>
-              <a:buNone/>
-              <a:defRPr sz="1800" b="0" i="0" u="none" strike="noStrike" cap="none">
-                <a:solidFill>
-                  <a:schemeClr val="dk1"/>
-                </a:solidFill>
-                <a:latin typeface="Calibri"/>
-                <a:ea typeface="Calibri"/>
-                <a:cs typeface="Calibri"/>
-                <a:sym typeface="Calibri"/>
-              </a:defRPr>
-            </a:lvl7pPr>
-            <a:lvl8pPr marR="0" lvl="7" algn="l" rtl="0">
-              <a:spcBef>
-                <a:spcPts val="0"/>
-              </a:spcBef>
-              <a:spcAft>
-                <a:spcPts val="0"/>
-              </a:spcAft>
-              <a:buSzPts val="1400"/>
-              <a:buNone/>
-              <a:defRPr sz="1800" b="0" i="0" u="none" strike="noStrike" cap="none">
-                <a:solidFill>
-                  <a:schemeClr val="dk1"/>
-                </a:solidFill>
-                <a:latin typeface="Calibri"/>
-                <a:ea typeface="Calibri"/>
-                <a:cs typeface="Calibri"/>
-                <a:sym typeface="Calibri"/>
-              </a:defRPr>
-            </a:lvl8pPr>
-            <a:lvl9pPr marR="0" lvl="8" algn="l" rtl="0">
-              <a:spcBef>
-                <a:spcPts val="0"/>
-              </a:spcBef>
-              <a:spcAft>
-                <a:spcPts val="0"/>
-              </a:spcAft>
-              <a:buSzPts val="1400"/>
-              <a:buNone/>
-              <a:defRPr sz="1800" b="0" i="0" u="none" strike="noStrike" cap="none">
-                <a:solidFill>
-                  <a:schemeClr val="dk1"/>
-                </a:solidFill>
-                <a:latin typeface="Calibri"/>
-                <a:ea typeface="Calibri"/>
-                <a:cs typeface="Calibri"/>
-                <a:sym typeface="Calibri"/>
-              </a:defRPr>
-            </a:lvl9pPr>
-          </a:lstStyle>
-          <a:p>
-            <a:endParaRPr/>
-          </a:p>
-        </p:txBody>
-      </p:sp>
-      <p:sp>
-        <p:nvSpPr>
-          <p:cNvPr id="88" name="Google Shape;88;p13"/>
-          <p:cNvSpPr txBox="1">
-            <a:spLocks noGrp="1"/>
-          </p:cNvSpPr>
-          <p:nvPr>
-            <p:ph type="ftr" idx="11"/>
-          </p:nvPr>
-        </p:nvSpPr>
-        <p:spPr>
-          <a:xfrm>
-            <a:off x="4038600" y="6356350"/>
-            <a:ext cx="4114800" cy="365100"/>
-          </a:xfrm>
-          <a:prstGeom prst="rect">
-            <a:avLst/>
-          </a:prstGeom>
-          <a:noFill/>
-          <a:ln>
-            <a:noFill/>
-          </a:ln>
-        </p:spPr>
-        <p:txBody>
-          <a:bodyPr spcFirstLastPara="1" wrap="square" lIns="91425" tIns="45700" rIns="91425" bIns="45700" anchor="ctr" anchorCtr="0"/>
-          <a:lstStyle>
-            <a:lvl1pPr marR="0" lvl="0" algn="ctr" rtl="0">
-              <a:spcBef>
-                <a:spcPts val="0"/>
-              </a:spcBef>
-              <a:spcAft>
-                <a:spcPts val="0"/>
-              </a:spcAft>
-              <a:buSzPts val="1400"/>
-              <a:buNone/>
-              <a:defRPr sz="1200" b="0" i="0" u="none" strike="noStrike" cap="none">
-                <a:solidFill>
-                  <a:srgbClr val="888888"/>
-                </a:solidFill>
-                <a:latin typeface="Calibri"/>
-                <a:ea typeface="Calibri"/>
-                <a:cs typeface="Calibri"/>
-                <a:sym typeface="Calibri"/>
-              </a:defRPr>
-            </a:lvl1pPr>
-            <a:lvl2pPr marR="0" lvl="1" algn="l" rtl="0">
-              <a:spcBef>
-                <a:spcPts val="0"/>
-              </a:spcBef>
-              <a:spcAft>
-                <a:spcPts val="0"/>
-              </a:spcAft>
-              <a:buSzPts val="1400"/>
-              <a:buNone/>
-              <a:defRPr sz="1800" b="0" i="0" u="none" strike="noStrike" cap="none">
-                <a:solidFill>
-                  <a:schemeClr val="dk1"/>
-                </a:solidFill>
-                <a:latin typeface="Calibri"/>
-                <a:ea typeface="Calibri"/>
-                <a:cs typeface="Calibri"/>
-                <a:sym typeface="Calibri"/>
-              </a:defRPr>
-            </a:lvl2pPr>
-            <a:lvl3pPr marR="0" lvl="2" algn="l" rtl="0">
-              <a:spcBef>
-                <a:spcPts val="0"/>
-              </a:spcBef>
-              <a:spcAft>
-                <a:spcPts val="0"/>
-              </a:spcAft>
-              <a:buSzPts val="1400"/>
-              <a:buNone/>
-              <a:defRPr sz="1800" b="0" i="0" u="none" strike="noStrike" cap="none">
-                <a:solidFill>
-                  <a:schemeClr val="dk1"/>
-                </a:solidFill>
-                <a:latin typeface="Calibri"/>
-                <a:ea typeface="Calibri"/>
-                <a:cs typeface="Calibri"/>
-                <a:sym typeface="Calibri"/>
-              </a:defRPr>
-            </a:lvl3pPr>
-            <a:lvl4pPr marR="0" lvl="3" algn="l" rtl="0">
-              <a:spcBef>
-                <a:spcPts val="0"/>
-              </a:spcBef>
-              <a:spcAft>
-                <a:spcPts val="0"/>
-              </a:spcAft>
-              <a:buSzPts val="1400"/>
-              <a:buNone/>
-              <a:defRPr sz="1800" b="0" i="0" u="none" strike="noStrike" cap="none">
-                <a:solidFill>
-                  <a:schemeClr val="dk1"/>
-                </a:solidFill>
-                <a:latin typeface="Calibri"/>
-                <a:ea typeface="Calibri"/>
-                <a:cs typeface="Calibri"/>
-                <a:sym typeface="Calibri"/>
-              </a:defRPr>
-            </a:lvl4pPr>
-            <a:lvl5pPr marR="0" lvl="4" algn="l" rtl="0">
-              <a:spcBef>
-                <a:spcPts val="0"/>
-              </a:spcBef>
-              <a:spcAft>
-                <a:spcPts val="0"/>
-              </a:spcAft>
-              <a:buSzPts val="1400"/>
-              <a:buNone/>
-              <a:defRPr sz="1800" b="0" i="0" u="none" strike="noStrike" cap="none">
-                <a:solidFill>
-                  <a:schemeClr val="dk1"/>
-                </a:solidFill>
-                <a:latin typeface="Calibri"/>
-                <a:ea typeface="Calibri"/>
-                <a:cs typeface="Calibri"/>
-                <a:sym typeface="Calibri"/>
-              </a:defRPr>
-            </a:lvl5pPr>
-            <a:lvl6pPr marR="0" lvl="5" algn="l" rtl="0">
-              <a:spcBef>
-                <a:spcPts val="0"/>
-              </a:spcBef>
-              <a:spcAft>
-                <a:spcPts val="0"/>
-              </a:spcAft>
-              <a:buSzPts val="1400"/>
-              <a:buNone/>
-              <a:defRPr sz="1800" b="0" i="0" u="none" strike="noStrike" cap="none">
-                <a:solidFill>
-                  <a:schemeClr val="dk1"/>
-                </a:solidFill>
-                <a:latin typeface="Calibri"/>
-                <a:ea typeface="Calibri"/>
-                <a:cs typeface="Calibri"/>
-                <a:sym typeface="Calibri"/>
-              </a:defRPr>
-            </a:lvl6pPr>
-            <a:lvl7pPr marR="0" lvl="6" algn="l" rtl="0">
-              <a:spcBef>
-                <a:spcPts val="0"/>
-              </a:spcBef>
-              <a:spcAft>
-                <a:spcPts val="0"/>
-              </a:spcAft>
-              <a:buSzPts val="1400"/>
-              <a:buNone/>
-              <a:defRPr sz="1800" b="0" i="0" u="none" strike="noStrike" cap="none">
-                <a:solidFill>
-                  <a:schemeClr val="dk1"/>
-                </a:solidFill>
-                <a:latin typeface="Calibri"/>
-                <a:ea typeface="Calibri"/>
-                <a:cs typeface="Calibri"/>
-                <a:sym typeface="Calibri"/>
-              </a:defRPr>
-            </a:lvl7pPr>
-            <a:lvl8pPr marR="0" lvl="7" algn="l" rtl="0">
-              <a:spcBef>
-                <a:spcPts val="0"/>
-              </a:spcBef>
-              <a:spcAft>
-                <a:spcPts val="0"/>
-              </a:spcAft>
-              <a:buSzPts val="1400"/>
-              <a:buNone/>
-              <a:defRPr sz="1800" b="0" i="0" u="none" strike="noStrike" cap="none">
-                <a:solidFill>
-                  <a:schemeClr val="dk1"/>
-                </a:solidFill>
-                <a:latin typeface="Calibri"/>
-                <a:ea typeface="Calibri"/>
-                <a:cs typeface="Calibri"/>
-                <a:sym typeface="Calibri"/>
-              </a:defRPr>
-            </a:lvl8pPr>
-            <a:lvl9pPr marR="0" lvl="8" algn="l" rtl="0">
-              <a:spcBef>
-                <a:spcPts val="0"/>
-              </a:spcBef>
-              <a:spcAft>
-                <a:spcPts val="0"/>
-              </a:spcAft>
-              <a:buSzPts val="1400"/>
-              <a:buNone/>
-              <a:defRPr sz="1800" b="0" i="0" u="none" strike="noStrike" cap="none">
-                <a:solidFill>
-                  <a:schemeClr val="dk1"/>
-                </a:solidFill>
-                <a:latin typeface="Calibri"/>
-                <a:ea typeface="Calibri"/>
-                <a:cs typeface="Calibri"/>
-                <a:sym typeface="Calibri"/>
-              </a:defRPr>
-            </a:lvl9pPr>
-          </a:lstStyle>
-          <a:p>
-            <a:endParaRPr/>
-          </a:p>
-        </p:txBody>
-      </p:sp>
-      <p:sp>
-        <p:nvSpPr>
-          <p:cNvPr id="89" name="Google Shape;89;p13"/>
-          <p:cNvSpPr txBox="1">
-            <a:spLocks noGrp="1"/>
-          </p:cNvSpPr>
-          <p:nvPr>
-            <p:ph type="sldNum" idx="12"/>
-          </p:nvPr>
-        </p:nvSpPr>
-        <p:spPr>
-          <a:xfrm>
-            <a:off x="8610600" y="6356350"/>
-            <a:ext cx="2743200" cy="365100"/>
-          </a:xfrm>
-          <a:prstGeom prst="rect">
-            <a:avLst/>
-          </a:prstGeom>
-          <a:noFill/>
-          <a:ln>
-            <a:noFill/>
-          </a:ln>
-        </p:spPr>
-        <p:txBody>
-          <a:bodyPr spcFirstLastPara="1" wrap="square" lIns="91425" tIns="45700" rIns="91425" bIns="45700" anchor="ctr" anchorCtr="0">
-            <a:noAutofit/>
-          </a:bodyPr>
-          <a:lstStyle>
-            <a:lvl1pPr marL="0" marR="0" lvl="0" indent="0" algn="r" rtl="0">
-              <a:spcBef>
-                <a:spcPts val="0"/>
-              </a:spcBef>
-              <a:buNone/>
-              <a:defRPr sz="1200" b="0" i="0" u="none" strike="noStrike" cap="none">
-                <a:solidFill>
-                  <a:srgbClr val="888888"/>
-                </a:solidFill>
-                <a:latin typeface="Calibri"/>
-                <a:ea typeface="Calibri"/>
-                <a:cs typeface="Calibri"/>
-                <a:sym typeface="Calibri"/>
-              </a:defRPr>
-            </a:lvl1pPr>
-            <a:lvl2pPr marL="0" marR="0" lvl="1" indent="0" algn="r" rtl="0">
-              <a:spcBef>
-                <a:spcPts val="0"/>
-              </a:spcBef>
-              <a:buNone/>
-              <a:defRPr sz="1200" b="0" i="0" u="none" strike="noStrike" cap="none">
-                <a:solidFill>
-                  <a:srgbClr val="888888"/>
-                </a:solidFill>
-                <a:latin typeface="Calibri"/>
-                <a:ea typeface="Calibri"/>
-                <a:cs typeface="Calibri"/>
-                <a:sym typeface="Calibri"/>
-              </a:defRPr>
-            </a:lvl2pPr>
-            <a:lvl3pPr marL="0" marR="0" lvl="2" indent="0" algn="r" rtl="0">
-              <a:spcBef>
-                <a:spcPts val="0"/>
-              </a:spcBef>
-              <a:buNone/>
-              <a:defRPr sz="1200" b="0" i="0" u="none" strike="noStrike" cap="none">
-                <a:solidFill>
-                  <a:srgbClr val="888888"/>
-                </a:solidFill>
-                <a:latin typeface="Calibri"/>
-                <a:ea typeface="Calibri"/>
-                <a:cs typeface="Calibri"/>
-                <a:sym typeface="Calibri"/>
-              </a:defRPr>
-            </a:lvl3pPr>
-            <a:lvl4pPr marL="0" marR="0" lvl="3" indent="0" algn="r" rtl="0">
-              <a:spcBef>
-                <a:spcPts val="0"/>
-              </a:spcBef>
-              <a:buNone/>
-              <a:defRPr sz="1200" b="0" i="0" u="none" strike="noStrike" cap="none">
-                <a:solidFill>
-                  <a:srgbClr val="888888"/>
-                </a:solidFill>
-                <a:latin typeface="Calibri"/>
-                <a:ea typeface="Calibri"/>
-                <a:cs typeface="Calibri"/>
-                <a:sym typeface="Calibri"/>
-              </a:defRPr>
-            </a:lvl4pPr>
-            <a:lvl5pPr marL="0" marR="0" lvl="4" indent="0" algn="r" rtl="0">
-              <a:spcBef>
-                <a:spcPts val="0"/>
-              </a:spcBef>
-              <a:buNone/>
-              <a:defRPr sz="1200" b="0" i="0" u="none" strike="noStrike" cap="none">
-                <a:solidFill>
-                  <a:srgbClr val="888888"/>
-                </a:solidFill>
-                <a:latin typeface="Calibri"/>
-                <a:ea typeface="Calibri"/>
-                <a:cs typeface="Calibri"/>
-                <a:sym typeface="Calibri"/>
-              </a:defRPr>
-            </a:lvl5pPr>
-            <a:lvl6pPr marL="0" marR="0" lvl="5" indent="0" algn="r" rtl="0">
-              <a:spcBef>
-                <a:spcPts val="0"/>
-              </a:spcBef>
-              <a:buNone/>
-              <a:defRPr sz="1200" b="0" i="0" u="none" strike="noStrike" cap="none">
-                <a:solidFill>
-                  <a:srgbClr val="888888"/>
-                </a:solidFill>
-                <a:latin typeface="Calibri"/>
-                <a:ea typeface="Calibri"/>
-                <a:cs typeface="Calibri"/>
-                <a:sym typeface="Calibri"/>
-              </a:defRPr>
-            </a:lvl6pPr>
-            <a:lvl7pPr marL="0" marR="0" lvl="6" indent="0" algn="r" rtl="0">
-              <a:spcBef>
-                <a:spcPts val="0"/>
-              </a:spcBef>
-              <a:buNone/>
-              <a:defRPr sz="1200" b="0" i="0" u="none" strike="noStrike" cap="none">
-                <a:solidFill>
-                  <a:srgbClr val="888888"/>
-                </a:solidFill>
-                <a:latin typeface="Calibri"/>
-                <a:ea typeface="Calibri"/>
-                <a:cs typeface="Calibri"/>
-                <a:sym typeface="Calibri"/>
-              </a:defRPr>
-            </a:lvl7pPr>
-            <a:lvl8pPr marL="0" marR="0" lvl="7" indent="0" algn="r" rtl="0">
-              <a:spcBef>
-                <a:spcPts val="0"/>
-              </a:spcBef>
-              <a:buNone/>
-              <a:defRPr sz="1200" b="0" i="0" u="none" strike="noStrike" cap="none">
-                <a:solidFill>
-                  <a:srgbClr val="888888"/>
-                </a:solidFill>
-                <a:latin typeface="Calibri"/>
-                <a:ea typeface="Calibri"/>
-                <a:cs typeface="Calibri"/>
-                <a:sym typeface="Calibri"/>
-              </a:defRPr>
-            </a:lvl8pPr>
-            <a:lvl9pPr marL="0" marR="0" lvl="8" indent="0" algn="r" rtl="0">
-              <a:spcBef>
-                <a:spcPts val="0"/>
-              </a:spcBef>
-              <a:buNone/>
-              <a:defRPr sz="1200" b="0" i="0" u="none" strike="noStrike" cap="none">
-                <a:solidFill>
-                  <a:srgbClr val="888888"/>
-                </a:solidFill>
-                <a:latin typeface="Calibri"/>
-                <a:ea typeface="Calibri"/>
-                <a:cs typeface="Calibri"/>
-                <a:sym typeface="Calibri"/>
-              </a:defRPr>
-            </a:lvl9pPr>
-          </a:lstStyle>
-          <a:p>
-            <a:pPr marL="0" lvl="0" indent="0">
-              <a:spcBef>
-                <a:spcPts val="0"/>
-              </a:spcBef>
-              <a:spcAft>
-                <a:spcPts val="0"/>
-              </a:spcAft>
-              <a:buNone/>
-            </a:pPr>
-            <a:fld id="{00000000-1234-1234-1234-123412341234}" type="slidenum">
-              <a:rPr lang="en-US"/>
-              <a:t>‹#›</a:t>
-            </a:fld>
-            <a:endParaRPr/>
-          </a:p>
-        </p:txBody>
-      </p:sp>
-    </p:spTree>
-  </p:cSld>
-  <p:clrMapOvr>
-    <a:masterClrMapping/>
-  </p:clrMapOvr>
-</p:sldLayout>
-</file>
-
-<file path=ppt/slideLayouts/slideLayout11.xml><?xml version="1.0" encoding="utf-8"?>
 <p:sldLayout xmlns:a="http://schemas.openxmlformats.org/drawingml/2006/main" xmlns:r="http://schemas.openxmlformats.org/officeDocument/2006/relationships" xmlns:p="http://schemas.openxmlformats.org/presentationml/2006/main" matchingName="Vertical Title and Text" type="vertTitleAndTx">
   <p:cSld name="VERTICAL_TITLE_AND_VERTICAL_TEXT">
     <p:spTree>
@@ -7219,1031 +6528,6 @@
 </file>
 
 <file path=ppt/slideLayouts/slideLayout3.xml><?xml version="1.0" encoding="utf-8"?>
-<p:sldLayout xmlns:a="http://schemas.openxmlformats.org/drawingml/2006/main" xmlns:r="http://schemas.openxmlformats.org/officeDocument/2006/relationships" xmlns:p="http://schemas.openxmlformats.org/presentationml/2006/main" matchingName="Section Header" type="secHead">
-  <p:cSld name="SECTION_HEADER">
-    <p:spTree>
-      <p:nvGrpSpPr>
-        <p:cNvPr id="1" name="Shape 39"/>
-        <p:cNvGrpSpPr/>
-        <p:nvPr/>
-      </p:nvGrpSpPr>
-      <p:grpSpPr>
-        <a:xfrm>
-          <a:off x="0" y="0"/>
-          <a:ext cx="0" cy="0"/>
-          <a:chOff x="0" y="0"/>
-          <a:chExt cx="0" cy="0"/>
-        </a:xfrm>
-      </p:grpSpPr>
-      <p:sp>
-        <p:nvSpPr>
-          <p:cNvPr id="40" name="Google Shape;40;p6"/>
-          <p:cNvSpPr txBox="1">
-            <a:spLocks noGrp="1"/>
-          </p:cNvSpPr>
-          <p:nvPr>
-            <p:ph type="title"/>
-          </p:nvPr>
-        </p:nvSpPr>
-        <p:spPr>
-          <a:xfrm>
-            <a:off x="831850" y="1709738"/>
-            <a:ext cx="10515600" cy="2852700"/>
-          </a:xfrm>
-          <a:prstGeom prst="rect">
-            <a:avLst/>
-          </a:prstGeom>
-          <a:noFill/>
-          <a:ln>
-            <a:noFill/>
-          </a:ln>
-        </p:spPr>
-        <p:txBody>
-          <a:bodyPr spcFirstLastPara="1" wrap="square" lIns="91425" tIns="45700" rIns="91425" bIns="45700" anchor="b" anchorCtr="0"/>
-          <a:lstStyle>
-            <a:lvl1pPr marR="0" lvl="0" algn="l" rtl="0">
-              <a:lnSpc>
-                <a:spcPct val="90000"/>
-              </a:lnSpc>
-              <a:spcBef>
-                <a:spcPts val="0"/>
-              </a:spcBef>
-              <a:spcAft>
-                <a:spcPts val="0"/>
-              </a:spcAft>
-              <a:buClr>
-                <a:schemeClr val="dk1"/>
-              </a:buClr>
-              <a:buSzPts val="6000"/>
-              <a:buFont typeface="Calibri"/>
-              <a:buNone/>
-              <a:defRPr sz="6000" b="0" i="0" u="none" strike="noStrike" cap="none">
-                <a:solidFill>
-                  <a:schemeClr val="dk1"/>
-                </a:solidFill>
-                <a:latin typeface="Calibri"/>
-                <a:ea typeface="Calibri"/>
-                <a:cs typeface="Calibri"/>
-                <a:sym typeface="Calibri"/>
-              </a:defRPr>
-            </a:lvl1pPr>
-            <a:lvl2pPr lvl="1" rtl="0">
-              <a:spcBef>
-                <a:spcPts val="0"/>
-              </a:spcBef>
-              <a:spcAft>
-                <a:spcPts val="0"/>
-              </a:spcAft>
-              <a:buSzPts val="1400"/>
-              <a:buNone/>
-              <a:defRPr sz="1800"/>
-            </a:lvl2pPr>
-            <a:lvl3pPr lvl="2" rtl="0">
-              <a:spcBef>
-                <a:spcPts val="0"/>
-              </a:spcBef>
-              <a:spcAft>
-                <a:spcPts val="0"/>
-              </a:spcAft>
-              <a:buSzPts val="1400"/>
-              <a:buNone/>
-              <a:defRPr sz="1800"/>
-            </a:lvl3pPr>
-            <a:lvl4pPr lvl="3" rtl="0">
-              <a:spcBef>
-                <a:spcPts val="0"/>
-              </a:spcBef>
-              <a:spcAft>
-                <a:spcPts val="0"/>
-              </a:spcAft>
-              <a:buSzPts val="1400"/>
-              <a:buNone/>
-              <a:defRPr sz="1800"/>
-            </a:lvl4pPr>
-            <a:lvl5pPr lvl="4" rtl="0">
-              <a:spcBef>
-                <a:spcPts val="0"/>
-              </a:spcBef>
-              <a:spcAft>
-                <a:spcPts val="0"/>
-              </a:spcAft>
-              <a:buSzPts val="1400"/>
-              <a:buNone/>
-              <a:defRPr sz="1800"/>
-            </a:lvl5pPr>
-            <a:lvl6pPr lvl="5" rtl="0">
-              <a:spcBef>
-                <a:spcPts val="0"/>
-              </a:spcBef>
-              <a:spcAft>
-                <a:spcPts val="0"/>
-              </a:spcAft>
-              <a:buSzPts val="1400"/>
-              <a:buNone/>
-              <a:defRPr sz="1800"/>
-            </a:lvl6pPr>
-            <a:lvl7pPr lvl="6" rtl="0">
-              <a:spcBef>
-                <a:spcPts val="0"/>
-              </a:spcBef>
-              <a:spcAft>
-                <a:spcPts val="0"/>
-              </a:spcAft>
-              <a:buSzPts val="1400"/>
-              <a:buNone/>
-              <a:defRPr sz="1800"/>
-            </a:lvl7pPr>
-            <a:lvl8pPr lvl="7" rtl="0">
-              <a:spcBef>
-                <a:spcPts val="0"/>
-              </a:spcBef>
-              <a:spcAft>
-                <a:spcPts val="0"/>
-              </a:spcAft>
-              <a:buSzPts val="1400"/>
-              <a:buNone/>
-              <a:defRPr sz="1800"/>
-            </a:lvl8pPr>
-            <a:lvl9pPr lvl="8" rtl="0">
-              <a:spcBef>
-                <a:spcPts val="0"/>
-              </a:spcBef>
-              <a:spcAft>
-                <a:spcPts val="0"/>
-              </a:spcAft>
-              <a:buSzPts val="1400"/>
-              <a:buNone/>
-              <a:defRPr sz="1800"/>
-            </a:lvl9pPr>
-          </a:lstStyle>
-          <a:p>
-            <a:endParaRPr/>
-          </a:p>
-        </p:txBody>
-      </p:sp>
-      <p:sp>
-        <p:nvSpPr>
-          <p:cNvPr id="41" name="Google Shape;41;p6"/>
-          <p:cNvSpPr txBox="1">
-            <a:spLocks noGrp="1"/>
-          </p:cNvSpPr>
-          <p:nvPr>
-            <p:ph type="body" idx="1"/>
-          </p:nvPr>
-        </p:nvSpPr>
-        <p:spPr>
-          <a:xfrm>
-            <a:off x="831850" y="4589463"/>
-            <a:ext cx="10515600" cy="1500300"/>
-          </a:xfrm>
-          <a:prstGeom prst="rect">
-            <a:avLst/>
-          </a:prstGeom>
-          <a:noFill/>
-          <a:ln>
-            <a:noFill/>
-          </a:ln>
-        </p:spPr>
-        <p:txBody>
-          <a:bodyPr spcFirstLastPara="1" wrap="square" lIns="91425" tIns="45700" rIns="91425" bIns="45700" anchor="t" anchorCtr="0"/>
-          <a:lstStyle>
-            <a:lvl1pPr marL="457200" marR="0" lvl="0" indent="-228600" algn="l" rtl="0">
-              <a:lnSpc>
-                <a:spcPct val="90000"/>
-              </a:lnSpc>
-              <a:spcBef>
-                <a:spcPts val="1000"/>
-              </a:spcBef>
-              <a:spcAft>
-                <a:spcPts val="0"/>
-              </a:spcAft>
-              <a:buClr>
-                <a:srgbClr val="888888"/>
-              </a:buClr>
-              <a:buSzPts val="2400"/>
-              <a:buFont typeface="Arial"/>
-              <a:buNone/>
-              <a:defRPr sz="2400" b="0" i="0" u="none" strike="noStrike" cap="none">
-                <a:solidFill>
-                  <a:srgbClr val="888888"/>
-                </a:solidFill>
-                <a:latin typeface="Calibri"/>
-                <a:ea typeface="Calibri"/>
-                <a:cs typeface="Calibri"/>
-                <a:sym typeface="Calibri"/>
-              </a:defRPr>
-            </a:lvl1pPr>
-            <a:lvl2pPr marL="914400" marR="0" lvl="1" indent="-228600" algn="l" rtl="0">
-              <a:lnSpc>
-                <a:spcPct val="90000"/>
-              </a:lnSpc>
-              <a:spcBef>
-                <a:spcPts val="500"/>
-              </a:spcBef>
-              <a:spcAft>
-                <a:spcPts val="0"/>
-              </a:spcAft>
-              <a:buClr>
-                <a:srgbClr val="888888"/>
-              </a:buClr>
-              <a:buSzPts val="2000"/>
-              <a:buFont typeface="Arial"/>
-              <a:buNone/>
-              <a:defRPr sz="2000" b="0" i="0" u="none" strike="noStrike" cap="none">
-                <a:solidFill>
-                  <a:srgbClr val="888888"/>
-                </a:solidFill>
-                <a:latin typeface="Calibri"/>
-                <a:ea typeface="Calibri"/>
-                <a:cs typeface="Calibri"/>
-                <a:sym typeface="Calibri"/>
-              </a:defRPr>
-            </a:lvl2pPr>
-            <a:lvl3pPr marL="1371600" marR="0" lvl="2" indent="-228600" algn="l" rtl="0">
-              <a:lnSpc>
-                <a:spcPct val="90000"/>
-              </a:lnSpc>
-              <a:spcBef>
-                <a:spcPts val="500"/>
-              </a:spcBef>
-              <a:spcAft>
-                <a:spcPts val="0"/>
-              </a:spcAft>
-              <a:buClr>
-                <a:srgbClr val="888888"/>
-              </a:buClr>
-              <a:buSzPts val="1800"/>
-              <a:buFont typeface="Arial"/>
-              <a:buNone/>
-              <a:defRPr sz="1800" b="0" i="0" u="none" strike="noStrike" cap="none">
-                <a:solidFill>
-                  <a:srgbClr val="888888"/>
-                </a:solidFill>
-                <a:latin typeface="Calibri"/>
-                <a:ea typeface="Calibri"/>
-                <a:cs typeface="Calibri"/>
-                <a:sym typeface="Calibri"/>
-              </a:defRPr>
-            </a:lvl3pPr>
-            <a:lvl4pPr marL="1828800" marR="0" lvl="3" indent="-228600" algn="l" rtl="0">
-              <a:lnSpc>
-                <a:spcPct val="90000"/>
-              </a:lnSpc>
-              <a:spcBef>
-                <a:spcPts val="500"/>
-              </a:spcBef>
-              <a:spcAft>
-                <a:spcPts val="0"/>
-              </a:spcAft>
-              <a:buClr>
-                <a:srgbClr val="888888"/>
-              </a:buClr>
-              <a:buSzPts val="1600"/>
-              <a:buFont typeface="Arial"/>
-              <a:buNone/>
-              <a:defRPr sz="1600" b="0" i="0" u="none" strike="noStrike" cap="none">
-                <a:solidFill>
-                  <a:srgbClr val="888888"/>
-                </a:solidFill>
-                <a:latin typeface="Calibri"/>
-                <a:ea typeface="Calibri"/>
-                <a:cs typeface="Calibri"/>
-                <a:sym typeface="Calibri"/>
-              </a:defRPr>
-            </a:lvl4pPr>
-            <a:lvl5pPr marL="2286000" marR="0" lvl="4" indent="-228600" algn="l" rtl="0">
-              <a:lnSpc>
-                <a:spcPct val="90000"/>
-              </a:lnSpc>
-              <a:spcBef>
-                <a:spcPts val="500"/>
-              </a:spcBef>
-              <a:spcAft>
-                <a:spcPts val="0"/>
-              </a:spcAft>
-              <a:buClr>
-                <a:srgbClr val="888888"/>
-              </a:buClr>
-              <a:buSzPts val="1600"/>
-              <a:buFont typeface="Arial"/>
-              <a:buNone/>
-              <a:defRPr sz="1600" b="0" i="0" u="none" strike="noStrike" cap="none">
-                <a:solidFill>
-                  <a:srgbClr val="888888"/>
-                </a:solidFill>
-                <a:latin typeface="Calibri"/>
-                <a:ea typeface="Calibri"/>
-                <a:cs typeface="Calibri"/>
-                <a:sym typeface="Calibri"/>
-              </a:defRPr>
-            </a:lvl5pPr>
-            <a:lvl6pPr marL="2743200" marR="0" lvl="5" indent="-228600" algn="l" rtl="0">
-              <a:lnSpc>
-                <a:spcPct val="90000"/>
-              </a:lnSpc>
-              <a:spcBef>
-                <a:spcPts val="500"/>
-              </a:spcBef>
-              <a:spcAft>
-                <a:spcPts val="0"/>
-              </a:spcAft>
-              <a:buClr>
-                <a:srgbClr val="888888"/>
-              </a:buClr>
-              <a:buSzPts val="1600"/>
-              <a:buFont typeface="Arial"/>
-              <a:buNone/>
-              <a:defRPr sz="1600" b="0" i="0" u="none" strike="noStrike" cap="none">
-                <a:solidFill>
-                  <a:srgbClr val="888888"/>
-                </a:solidFill>
-                <a:latin typeface="Calibri"/>
-                <a:ea typeface="Calibri"/>
-                <a:cs typeface="Calibri"/>
-                <a:sym typeface="Calibri"/>
-              </a:defRPr>
-            </a:lvl6pPr>
-            <a:lvl7pPr marL="3200400" marR="0" lvl="6" indent="-228600" algn="l" rtl="0">
-              <a:lnSpc>
-                <a:spcPct val="90000"/>
-              </a:lnSpc>
-              <a:spcBef>
-                <a:spcPts val="500"/>
-              </a:spcBef>
-              <a:spcAft>
-                <a:spcPts val="0"/>
-              </a:spcAft>
-              <a:buClr>
-                <a:srgbClr val="888888"/>
-              </a:buClr>
-              <a:buSzPts val="1600"/>
-              <a:buFont typeface="Arial"/>
-              <a:buNone/>
-              <a:defRPr sz="1600" b="0" i="0" u="none" strike="noStrike" cap="none">
-                <a:solidFill>
-                  <a:srgbClr val="888888"/>
-                </a:solidFill>
-                <a:latin typeface="Calibri"/>
-                <a:ea typeface="Calibri"/>
-                <a:cs typeface="Calibri"/>
-                <a:sym typeface="Calibri"/>
-              </a:defRPr>
-            </a:lvl7pPr>
-            <a:lvl8pPr marL="3657600" marR="0" lvl="7" indent="-228600" algn="l" rtl="0">
-              <a:lnSpc>
-                <a:spcPct val="90000"/>
-              </a:lnSpc>
-              <a:spcBef>
-                <a:spcPts val="500"/>
-              </a:spcBef>
-              <a:spcAft>
-                <a:spcPts val="0"/>
-              </a:spcAft>
-              <a:buClr>
-                <a:srgbClr val="888888"/>
-              </a:buClr>
-              <a:buSzPts val="1600"/>
-              <a:buFont typeface="Arial"/>
-              <a:buNone/>
-              <a:defRPr sz="1600" b="0" i="0" u="none" strike="noStrike" cap="none">
-                <a:solidFill>
-                  <a:srgbClr val="888888"/>
-                </a:solidFill>
-                <a:latin typeface="Calibri"/>
-                <a:ea typeface="Calibri"/>
-                <a:cs typeface="Calibri"/>
-                <a:sym typeface="Calibri"/>
-              </a:defRPr>
-            </a:lvl8pPr>
-            <a:lvl9pPr marL="4114800" marR="0" lvl="8" indent="-228600" algn="l" rtl="0">
-              <a:lnSpc>
-                <a:spcPct val="90000"/>
-              </a:lnSpc>
-              <a:spcBef>
-                <a:spcPts val="500"/>
-              </a:spcBef>
-              <a:spcAft>
-                <a:spcPts val="0"/>
-              </a:spcAft>
-              <a:buClr>
-                <a:srgbClr val="888888"/>
-              </a:buClr>
-              <a:buSzPts val="1600"/>
-              <a:buFont typeface="Arial"/>
-              <a:buNone/>
-              <a:defRPr sz="1600" b="0" i="0" u="none" strike="noStrike" cap="none">
-                <a:solidFill>
-                  <a:srgbClr val="888888"/>
-                </a:solidFill>
-                <a:latin typeface="Calibri"/>
-                <a:ea typeface="Calibri"/>
-                <a:cs typeface="Calibri"/>
-                <a:sym typeface="Calibri"/>
-              </a:defRPr>
-            </a:lvl9pPr>
-          </a:lstStyle>
-          <a:p>
-            <a:endParaRPr/>
-          </a:p>
-        </p:txBody>
-      </p:sp>
-      <p:sp>
-        <p:nvSpPr>
-          <p:cNvPr id="42" name="Google Shape;42;p6"/>
-          <p:cNvSpPr txBox="1">
-            <a:spLocks noGrp="1"/>
-          </p:cNvSpPr>
-          <p:nvPr>
-            <p:ph type="dt" idx="10"/>
-          </p:nvPr>
-        </p:nvSpPr>
-        <p:spPr>
-          <a:xfrm>
-            <a:off x="838200" y="6356350"/>
-            <a:ext cx="2743200" cy="365100"/>
-          </a:xfrm>
-          <a:prstGeom prst="rect">
-            <a:avLst/>
-          </a:prstGeom>
-          <a:noFill/>
-          <a:ln>
-            <a:noFill/>
-          </a:ln>
-        </p:spPr>
-        <p:txBody>
-          <a:bodyPr spcFirstLastPara="1" wrap="square" lIns="91425" tIns="45700" rIns="91425" bIns="45700" anchor="ctr" anchorCtr="0"/>
-          <a:lstStyle>
-            <a:lvl1pPr marR="0" lvl="0" algn="l" rtl="0">
-              <a:spcBef>
-                <a:spcPts val="0"/>
-              </a:spcBef>
-              <a:spcAft>
-                <a:spcPts val="0"/>
-              </a:spcAft>
-              <a:buSzPts val="1400"/>
-              <a:buNone/>
-              <a:defRPr sz="1200" b="0" i="0" u="none" strike="noStrike" cap="none">
-                <a:solidFill>
-                  <a:srgbClr val="888888"/>
-                </a:solidFill>
-                <a:latin typeface="Calibri"/>
-                <a:ea typeface="Calibri"/>
-                <a:cs typeface="Calibri"/>
-                <a:sym typeface="Calibri"/>
-              </a:defRPr>
-            </a:lvl1pPr>
-            <a:lvl2pPr marR="0" lvl="1" algn="l" rtl="0">
-              <a:spcBef>
-                <a:spcPts val="0"/>
-              </a:spcBef>
-              <a:spcAft>
-                <a:spcPts val="0"/>
-              </a:spcAft>
-              <a:buSzPts val="1400"/>
-              <a:buNone/>
-              <a:defRPr sz="1800" b="0" i="0" u="none" strike="noStrike" cap="none">
-                <a:solidFill>
-                  <a:schemeClr val="dk1"/>
-                </a:solidFill>
-                <a:latin typeface="Calibri"/>
-                <a:ea typeface="Calibri"/>
-                <a:cs typeface="Calibri"/>
-                <a:sym typeface="Calibri"/>
-              </a:defRPr>
-            </a:lvl2pPr>
-            <a:lvl3pPr marR="0" lvl="2" algn="l" rtl="0">
-              <a:spcBef>
-                <a:spcPts val="0"/>
-              </a:spcBef>
-              <a:spcAft>
-                <a:spcPts val="0"/>
-              </a:spcAft>
-              <a:buSzPts val="1400"/>
-              <a:buNone/>
-              <a:defRPr sz="1800" b="0" i="0" u="none" strike="noStrike" cap="none">
-                <a:solidFill>
-                  <a:schemeClr val="dk1"/>
-                </a:solidFill>
-                <a:latin typeface="Calibri"/>
-                <a:ea typeface="Calibri"/>
-                <a:cs typeface="Calibri"/>
-                <a:sym typeface="Calibri"/>
-              </a:defRPr>
-            </a:lvl3pPr>
-            <a:lvl4pPr marR="0" lvl="3" algn="l" rtl="0">
-              <a:spcBef>
-                <a:spcPts val="0"/>
-              </a:spcBef>
-              <a:spcAft>
-                <a:spcPts val="0"/>
-              </a:spcAft>
-              <a:buSzPts val="1400"/>
-              <a:buNone/>
-              <a:defRPr sz="1800" b="0" i="0" u="none" strike="noStrike" cap="none">
-                <a:solidFill>
-                  <a:schemeClr val="dk1"/>
-                </a:solidFill>
-                <a:latin typeface="Calibri"/>
-                <a:ea typeface="Calibri"/>
-                <a:cs typeface="Calibri"/>
-                <a:sym typeface="Calibri"/>
-              </a:defRPr>
-            </a:lvl4pPr>
-            <a:lvl5pPr marR="0" lvl="4" algn="l" rtl="0">
-              <a:spcBef>
-                <a:spcPts val="0"/>
-              </a:spcBef>
-              <a:spcAft>
-                <a:spcPts val="0"/>
-              </a:spcAft>
-              <a:buSzPts val="1400"/>
-              <a:buNone/>
-              <a:defRPr sz="1800" b="0" i="0" u="none" strike="noStrike" cap="none">
-                <a:solidFill>
-                  <a:schemeClr val="dk1"/>
-                </a:solidFill>
-                <a:latin typeface="Calibri"/>
-                <a:ea typeface="Calibri"/>
-                <a:cs typeface="Calibri"/>
-                <a:sym typeface="Calibri"/>
-              </a:defRPr>
-            </a:lvl5pPr>
-            <a:lvl6pPr marR="0" lvl="5" algn="l" rtl="0">
-              <a:spcBef>
-                <a:spcPts val="0"/>
-              </a:spcBef>
-              <a:spcAft>
-                <a:spcPts val="0"/>
-              </a:spcAft>
-              <a:buSzPts val="1400"/>
-              <a:buNone/>
-              <a:defRPr sz="1800" b="0" i="0" u="none" strike="noStrike" cap="none">
-                <a:solidFill>
-                  <a:schemeClr val="dk1"/>
-                </a:solidFill>
-                <a:latin typeface="Calibri"/>
-                <a:ea typeface="Calibri"/>
-                <a:cs typeface="Calibri"/>
-                <a:sym typeface="Calibri"/>
-              </a:defRPr>
-            </a:lvl6pPr>
-            <a:lvl7pPr marR="0" lvl="6" algn="l" rtl="0">
-              <a:spcBef>
-                <a:spcPts val="0"/>
-              </a:spcBef>
-              <a:spcAft>
-                <a:spcPts val="0"/>
-              </a:spcAft>
-              <a:buSzPts val="1400"/>
-              <a:buNone/>
-              <a:defRPr sz="1800" b="0" i="0" u="none" strike="noStrike" cap="none">
-                <a:solidFill>
-                  <a:schemeClr val="dk1"/>
-                </a:solidFill>
-                <a:latin typeface="Calibri"/>
-                <a:ea typeface="Calibri"/>
-                <a:cs typeface="Calibri"/>
-                <a:sym typeface="Calibri"/>
-              </a:defRPr>
-            </a:lvl7pPr>
-            <a:lvl8pPr marR="0" lvl="7" algn="l" rtl="0">
-              <a:spcBef>
-                <a:spcPts val="0"/>
-              </a:spcBef>
-              <a:spcAft>
-                <a:spcPts val="0"/>
-              </a:spcAft>
-              <a:buSzPts val="1400"/>
-              <a:buNone/>
-              <a:defRPr sz="1800" b="0" i="0" u="none" strike="noStrike" cap="none">
-                <a:solidFill>
-                  <a:schemeClr val="dk1"/>
-                </a:solidFill>
-                <a:latin typeface="Calibri"/>
-                <a:ea typeface="Calibri"/>
-                <a:cs typeface="Calibri"/>
-                <a:sym typeface="Calibri"/>
-              </a:defRPr>
-            </a:lvl8pPr>
-            <a:lvl9pPr marR="0" lvl="8" algn="l" rtl="0">
-              <a:spcBef>
-                <a:spcPts val="0"/>
-              </a:spcBef>
-              <a:spcAft>
-                <a:spcPts val="0"/>
-              </a:spcAft>
-              <a:buSzPts val="1400"/>
-              <a:buNone/>
-              <a:defRPr sz="1800" b="0" i="0" u="none" strike="noStrike" cap="none">
-                <a:solidFill>
-                  <a:schemeClr val="dk1"/>
-                </a:solidFill>
-                <a:latin typeface="Calibri"/>
-                <a:ea typeface="Calibri"/>
-                <a:cs typeface="Calibri"/>
-                <a:sym typeface="Calibri"/>
-              </a:defRPr>
-            </a:lvl9pPr>
-          </a:lstStyle>
-          <a:p>
-            <a:endParaRPr/>
-          </a:p>
-        </p:txBody>
-      </p:sp>
-      <p:sp>
-        <p:nvSpPr>
-          <p:cNvPr id="43" name="Google Shape;43;p6"/>
-          <p:cNvSpPr txBox="1">
-            <a:spLocks noGrp="1"/>
-          </p:cNvSpPr>
-          <p:nvPr>
-            <p:ph type="ftr" idx="11"/>
-          </p:nvPr>
-        </p:nvSpPr>
-        <p:spPr>
-          <a:xfrm>
-            <a:off x="4038600" y="6356350"/>
-            <a:ext cx="4114800" cy="365100"/>
-          </a:xfrm>
-          <a:prstGeom prst="rect">
-            <a:avLst/>
-          </a:prstGeom>
-          <a:noFill/>
-          <a:ln>
-            <a:noFill/>
-          </a:ln>
-        </p:spPr>
-        <p:txBody>
-          <a:bodyPr spcFirstLastPara="1" wrap="square" lIns="91425" tIns="45700" rIns="91425" bIns="45700" anchor="ctr" anchorCtr="0"/>
-          <a:lstStyle>
-            <a:lvl1pPr marR="0" lvl="0" algn="ctr" rtl="0">
-              <a:spcBef>
-                <a:spcPts val="0"/>
-              </a:spcBef>
-              <a:spcAft>
-                <a:spcPts val="0"/>
-              </a:spcAft>
-              <a:buSzPts val="1400"/>
-              <a:buNone/>
-              <a:defRPr sz="1200" b="0" i="0" u="none" strike="noStrike" cap="none">
-                <a:solidFill>
-                  <a:srgbClr val="888888"/>
-                </a:solidFill>
-                <a:latin typeface="Calibri"/>
-                <a:ea typeface="Calibri"/>
-                <a:cs typeface="Calibri"/>
-                <a:sym typeface="Calibri"/>
-              </a:defRPr>
-            </a:lvl1pPr>
-            <a:lvl2pPr marR="0" lvl="1" algn="l" rtl="0">
-              <a:spcBef>
-                <a:spcPts val="0"/>
-              </a:spcBef>
-              <a:spcAft>
-                <a:spcPts val="0"/>
-              </a:spcAft>
-              <a:buSzPts val="1400"/>
-              <a:buNone/>
-              <a:defRPr sz="1800" b="0" i="0" u="none" strike="noStrike" cap="none">
-                <a:solidFill>
-                  <a:schemeClr val="dk1"/>
-                </a:solidFill>
-                <a:latin typeface="Calibri"/>
-                <a:ea typeface="Calibri"/>
-                <a:cs typeface="Calibri"/>
-                <a:sym typeface="Calibri"/>
-              </a:defRPr>
-            </a:lvl2pPr>
-            <a:lvl3pPr marR="0" lvl="2" algn="l" rtl="0">
-              <a:spcBef>
-                <a:spcPts val="0"/>
-              </a:spcBef>
-              <a:spcAft>
-                <a:spcPts val="0"/>
-              </a:spcAft>
-              <a:buSzPts val="1400"/>
-              <a:buNone/>
-              <a:defRPr sz="1800" b="0" i="0" u="none" strike="noStrike" cap="none">
-                <a:solidFill>
-                  <a:schemeClr val="dk1"/>
-                </a:solidFill>
-                <a:latin typeface="Calibri"/>
-                <a:ea typeface="Calibri"/>
-                <a:cs typeface="Calibri"/>
-                <a:sym typeface="Calibri"/>
-              </a:defRPr>
-            </a:lvl3pPr>
-            <a:lvl4pPr marR="0" lvl="3" algn="l" rtl="0">
-              <a:spcBef>
-                <a:spcPts val="0"/>
-              </a:spcBef>
-              <a:spcAft>
-                <a:spcPts val="0"/>
-              </a:spcAft>
-              <a:buSzPts val="1400"/>
-              <a:buNone/>
-              <a:defRPr sz="1800" b="0" i="0" u="none" strike="noStrike" cap="none">
-                <a:solidFill>
-                  <a:schemeClr val="dk1"/>
-                </a:solidFill>
-                <a:latin typeface="Calibri"/>
-                <a:ea typeface="Calibri"/>
-                <a:cs typeface="Calibri"/>
-                <a:sym typeface="Calibri"/>
-              </a:defRPr>
-            </a:lvl4pPr>
-            <a:lvl5pPr marR="0" lvl="4" algn="l" rtl="0">
-              <a:spcBef>
-                <a:spcPts val="0"/>
-              </a:spcBef>
-              <a:spcAft>
-                <a:spcPts val="0"/>
-              </a:spcAft>
-              <a:buSzPts val="1400"/>
-              <a:buNone/>
-              <a:defRPr sz="1800" b="0" i="0" u="none" strike="noStrike" cap="none">
-                <a:solidFill>
-                  <a:schemeClr val="dk1"/>
-                </a:solidFill>
-                <a:latin typeface="Calibri"/>
-                <a:ea typeface="Calibri"/>
-                <a:cs typeface="Calibri"/>
-                <a:sym typeface="Calibri"/>
-              </a:defRPr>
-            </a:lvl5pPr>
-            <a:lvl6pPr marR="0" lvl="5" algn="l" rtl="0">
-              <a:spcBef>
-                <a:spcPts val="0"/>
-              </a:spcBef>
-              <a:spcAft>
-                <a:spcPts val="0"/>
-              </a:spcAft>
-              <a:buSzPts val="1400"/>
-              <a:buNone/>
-              <a:defRPr sz="1800" b="0" i="0" u="none" strike="noStrike" cap="none">
-                <a:solidFill>
-                  <a:schemeClr val="dk1"/>
-                </a:solidFill>
-                <a:latin typeface="Calibri"/>
-                <a:ea typeface="Calibri"/>
-                <a:cs typeface="Calibri"/>
-                <a:sym typeface="Calibri"/>
-              </a:defRPr>
-            </a:lvl6pPr>
-            <a:lvl7pPr marR="0" lvl="6" algn="l" rtl="0">
-              <a:spcBef>
-                <a:spcPts val="0"/>
-              </a:spcBef>
-              <a:spcAft>
-                <a:spcPts val="0"/>
-              </a:spcAft>
-              <a:buSzPts val="1400"/>
-              <a:buNone/>
-              <a:defRPr sz="1800" b="0" i="0" u="none" strike="noStrike" cap="none">
-                <a:solidFill>
-                  <a:schemeClr val="dk1"/>
-                </a:solidFill>
-                <a:latin typeface="Calibri"/>
-                <a:ea typeface="Calibri"/>
-                <a:cs typeface="Calibri"/>
-                <a:sym typeface="Calibri"/>
-              </a:defRPr>
-            </a:lvl7pPr>
-            <a:lvl8pPr marR="0" lvl="7" algn="l" rtl="0">
-              <a:spcBef>
-                <a:spcPts val="0"/>
-              </a:spcBef>
-              <a:spcAft>
-                <a:spcPts val="0"/>
-              </a:spcAft>
-              <a:buSzPts val="1400"/>
-              <a:buNone/>
-              <a:defRPr sz="1800" b="0" i="0" u="none" strike="noStrike" cap="none">
-                <a:solidFill>
-                  <a:schemeClr val="dk1"/>
-                </a:solidFill>
-                <a:latin typeface="Calibri"/>
-                <a:ea typeface="Calibri"/>
-                <a:cs typeface="Calibri"/>
-                <a:sym typeface="Calibri"/>
-              </a:defRPr>
-            </a:lvl8pPr>
-            <a:lvl9pPr marR="0" lvl="8" algn="l" rtl="0">
-              <a:spcBef>
-                <a:spcPts val="0"/>
-              </a:spcBef>
-              <a:spcAft>
-                <a:spcPts val="0"/>
-              </a:spcAft>
-              <a:buSzPts val="1400"/>
-              <a:buNone/>
-              <a:defRPr sz="1800" b="0" i="0" u="none" strike="noStrike" cap="none">
-                <a:solidFill>
-                  <a:schemeClr val="dk1"/>
-                </a:solidFill>
-                <a:latin typeface="Calibri"/>
-                <a:ea typeface="Calibri"/>
-                <a:cs typeface="Calibri"/>
-                <a:sym typeface="Calibri"/>
-              </a:defRPr>
-            </a:lvl9pPr>
-          </a:lstStyle>
-          <a:p>
-            <a:endParaRPr/>
-          </a:p>
-        </p:txBody>
-      </p:sp>
-      <p:sp>
-        <p:nvSpPr>
-          <p:cNvPr id="44" name="Google Shape;44;p6"/>
-          <p:cNvSpPr txBox="1">
-            <a:spLocks noGrp="1"/>
-          </p:cNvSpPr>
-          <p:nvPr>
-            <p:ph type="sldNum" idx="12"/>
-          </p:nvPr>
-        </p:nvSpPr>
-        <p:spPr>
-          <a:xfrm>
-            <a:off x="8610600" y="6356350"/>
-            <a:ext cx="2743200" cy="365100"/>
-          </a:xfrm>
-          <a:prstGeom prst="rect">
-            <a:avLst/>
-          </a:prstGeom>
-          <a:noFill/>
-          <a:ln>
-            <a:noFill/>
-          </a:ln>
-        </p:spPr>
-        <p:txBody>
-          <a:bodyPr spcFirstLastPara="1" wrap="square" lIns="91425" tIns="45700" rIns="91425" bIns="45700" anchor="ctr" anchorCtr="0">
-            <a:noAutofit/>
-          </a:bodyPr>
-          <a:lstStyle>
-            <a:lvl1pPr marL="0" marR="0" lvl="0" indent="0" algn="r" rtl="0">
-              <a:spcBef>
-                <a:spcPts val="0"/>
-              </a:spcBef>
-              <a:buNone/>
-              <a:defRPr sz="1200" b="0" i="0" u="none" strike="noStrike" cap="none">
-                <a:solidFill>
-                  <a:srgbClr val="888888"/>
-                </a:solidFill>
-                <a:latin typeface="Calibri"/>
-                <a:ea typeface="Calibri"/>
-                <a:cs typeface="Calibri"/>
-                <a:sym typeface="Calibri"/>
-              </a:defRPr>
-            </a:lvl1pPr>
-            <a:lvl2pPr marL="0" marR="0" lvl="1" indent="0" algn="r" rtl="0">
-              <a:spcBef>
-                <a:spcPts val="0"/>
-              </a:spcBef>
-              <a:buNone/>
-              <a:defRPr sz="1200" b="0" i="0" u="none" strike="noStrike" cap="none">
-                <a:solidFill>
-                  <a:srgbClr val="888888"/>
-                </a:solidFill>
-                <a:latin typeface="Calibri"/>
-                <a:ea typeface="Calibri"/>
-                <a:cs typeface="Calibri"/>
-                <a:sym typeface="Calibri"/>
-              </a:defRPr>
-            </a:lvl2pPr>
-            <a:lvl3pPr marL="0" marR="0" lvl="2" indent="0" algn="r" rtl="0">
-              <a:spcBef>
-                <a:spcPts val="0"/>
-              </a:spcBef>
-              <a:buNone/>
-              <a:defRPr sz="1200" b="0" i="0" u="none" strike="noStrike" cap="none">
-                <a:solidFill>
-                  <a:srgbClr val="888888"/>
-                </a:solidFill>
-                <a:latin typeface="Calibri"/>
-                <a:ea typeface="Calibri"/>
-                <a:cs typeface="Calibri"/>
-                <a:sym typeface="Calibri"/>
-              </a:defRPr>
-            </a:lvl3pPr>
-            <a:lvl4pPr marL="0" marR="0" lvl="3" indent="0" algn="r" rtl="0">
-              <a:spcBef>
-                <a:spcPts val="0"/>
-              </a:spcBef>
-              <a:buNone/>
-              <a:defRPr sz="1200" b="0" i="0" u="none" strike="noStrike" cap="none">
-                <a:solidFill>
-                  <a:srgbClr val="888888"/>
-                </a:solidFill>
-                <a:latin typeface="Calibri"/>
-                <a:ea typeface="Calibri"/>
-                <a:cs typeface="Calibri"/>
-                <a:sym typeface="Calibri"/>
-              </a:defRPr>
-            </a:lvl4pPr>
-            <a:lvl5pPr marL="0" marR="0" lvl="4" indent="0" algn="r" rtl="0">
-              <a:spcBef>
-                <a:spcPts val="0"/>
-              </a:spcBef>
-              <a:buNone/>
-              <a:defRPr sz="1200" b="0" i="0" u="none" strike="noStrike" cap="none">
-                <a:solidFill>
-                  <a:srgbClr val="888888"/>
-                </a:solidFill>
-                <a:latin typeface="Calibri"/>
-                <a:ea typeface="Calibri"/>
-                <a:cs typeface="Calibri"/>
-                <a:sym typeface="Calibri"/>
-              </a:defRPr>
-            </a:lvl5pPr>
-            <a:lvl6pPr marL="0" marR="0" lvl="5" indent="0" algn="r" rtl="0">
-              <a:spcBef>
-                <a:spcPts val="0"/>
-              </a:spcBef>
-              <a:buNone/>
-              <a:defRPr sz="1200" b="0" i="0" u="none" strike="noStrike" cap="none">
-                <a:solidFill>
-                  <a:srgbClr val="888888"/>
-                </a:solidFill>
-                <a:latin typeface="Calibri"/>
-                <a:ea typeface="Calibri"/>
-                <a:cs typeface="Calibri"/>
-                <a:sym typeface="Calibri"/>
-              </a:defRPr>
-            </a:lvl6pPr>
-            <a:lvl7pPr marL="0" marR="0" lvl="6" indent="0" algn="r" rtl="0">
-              <a:spcBef>
-                <a:spcPts val="0"/>
-              </a:spcBef>
-              <a:buNone/>
-              <a:defRPr sz="1200" b="0" i="0" u="none" strike="noStrike" cap="none">
-                <a:solidFill>
-                  <a:srgbClr val="888888"/>
-                </a:solidFill>
-                <a:latin typeface="Calibri"/>
-                <a:ea typeface="Calibri"/>
-                <a:cs typeface="Calibri"/>
-                <a:sym typeface="Calibri"/>
-              </a:defRPr>
-            </a:lvl7pPr>
-            <a:lvl8pPr marL="0" marR="0" lvl="7" indent="0" algn="r" rtl="0">
-              <a:spcBef>
-                <a:spcPts val="0"/>
-              </a:spcBef>
-              <a:buNone/>
-              <a:defRPr sz="1200" b="0" i="0" u="none" strike="noStrike" cap="none">
-                <a:solidFill>
-                  <a:srgbClr val="888888"/>
-                </a:solidFill>
-                <a:latin typeface="Calibri"/>
-                <a:ea typeface="Calibri"/>
-                <a:cs typeface="Calibri"/>
-                <a:sym typeface="Calibri"/>
-              </a:defRPr>
-            </a:lvl8pPr>
-            <a:lvl9pPr marL="0" marR="0" lvl="8" indent="0" algn="r" rtl="0">
-              <a:spcBef>
-                <a:spcPts val="0"/>
-              </a:spcBef>
-              <a:buNone/>
-              <a:defRPr sz="1200" b="0" i="0" u="none" strike="noStrike" cap="none">
-                <a:solidFill>
-                  <a:srgbClr val="888888"/>
-                </a:solidFill>
-                <a:latin typeface="Calibri"/>
-                <a:ea typeface="Calibri"/>
-                <a:cs typeface="Calibri"/>
-                <a:sym typeface="Calibri"/>
-              </a:defRPr>
-            </a:lvl9pPr>
-          </a:lstStyle>
-          <a:p>
-            <a:pPr marL="0" lvl="0" indent="0">
-              <a:spcBef>
-                <a:spcPts val="0"/>
-              </a:spcBef>
-              <a:spcAft>
-                <a:spcPts val="0"/>
-              </a:spcAft>
-              <a:buNone/>
-            </a:pPr>
-            <a:fld id="{00000000-1234-1234-1234-123412341234}" type="slidenum">
-              <a:rPr lang="en-US"/>
-              <a:t>‹#›</a:t>
-            </a:fld>
-            <a:endParaRPr/>
-          </a:p>
-        </p:txBody>
-      </p:sp>
-    </p:spTree>
-  </p:cSld>
-  <p:clrMapOvr>
-    <a:masterClrMapping/>
-  </p:clrMapOvr>
-</p:sldLayout>
-</file>
-
-<file path=ppt/slideLayouts/slideLayout4.xml><?xml version="1.0" encoding="utf-8"?>
 <p:sldLayout xmlns:a="http://schemas.openxmlformats.org/drawingml/2006/main" xmlns:r="http://schemas.openxmlformats.org/officeDocument/2006/relationships" xmlns:p="http://schemas.openxmlformats.org/presentationml/2006/main" matchingName="Two Content" type="twoObj">
   <p:cSld name="TWO_OBJECTS">
     <p:spTree>
@@ -9534,7 +7818,7 @@
 </p:sldLayout>
 </file>
 
-<file path=ppt/slideLayouts/slideLayout5.xml><?xml version="1.0" encoding="utf-8"?>
+<file path=ppt/slideLayouts/slideLayout4.xml><?xml version="1.0" encoding="utf-8"?>
 <p:sldLayout xmlns:a="http://schemas.openxmlformats.org/drawingml/2006/main" xmlns:r="http://schemas.openxmlformats.org/officeDocument/2006/relationships" xmlns:p="http://schemas.openxmlformats.org/presentationml/2006/main" matchingName="Comparison" type="twoTxTwoObj">
   <p:cSld name="TWO_OBJECTS_WITH_TEXT">
     <p:spTree>
@@ -11357,7 +9641,7 @@
 </p:sldLayout>
 </file>
 
-<file path=ppt/slideLayouts/slideLayout6.xml><?xml version="1.0" encoding="utf-8"?>
+<file path=ppt/slideLayouts/slideLayout5.xml><?xml version="1.0" encoding="utf-8"?>
 <p:sldLayout xmlns:a="http://schemas.openxmlformats.org/drawingml/2006/main" xmlns:r="http://schemas.openxmlformats.org/officeDocument/2006/relationships" xmlns:p="http://schemas.openxmlformats.org/presentationml/2006/main" matchingName="Title Only" type="titleOnly">
   <p:cSld name="TITLE_ONLY">
     <p:spTree>
@@ -12116,7 +10400,7 @@
 </p:sldLayout>
 </file>
 
-<file path=ppt/slideLayouts/slideLayout7.xml><?xml version="1.0" encoding="utf-8"?>
+<file path=ppt/slideLayouts/slideLayout6.xml><?xml version="1.0" encoding="utf-8"?>
 <p:sldLayout xmlns:a="http://schemas.openxmlformats.org/drawingml/2006/main" xmlns:r="http://schemas.openxmlformats.org/officeDocument/2006/relationships" xmlns:p="http://schemas.openxmlformats.org/presentationml/2006/main" matchingName="Blank" type="blank">
   <p:cSld name="BLANK">
     <p:spTree>
@@ -12729,7 +11013,7 @@
 </p:sldLayout>
 </file>
 
-<file path=ppt/slideLayouts/slideLayout8.xml><?xml version="1.0" encoding="utf-8"?>
+<file path=ppt/slideLayouts/slideLayout7.xml><?xml version="1.0" encoding="utf-8"?>
 <p:sldLayout xmlns:a="http://schemas.openxmlformats.org/drawingml/2006/main" xmlns:r="http://schemas.openxmlformats.org/officeDocument/2006/relationships" xmlns:p="http://schemas.openxmlformats.org/presentationml/2006/main" matchingName="Content with Caption" type="objTx">
   <p:cSld name="OBJECT_WITH_CAPTION_TEXT">
     <p:spTree>
@@ -14020,7 +12304,7 @@
 </p:sldLayout>
 </file>
 
-<file path=ppt/slideLayouts/slideLayout9.xml><?xml version="1.0" encoding="utf-8"?>
+<file path=ppt/slideLayouts/slideLayout8.xml><?xml version="1.0" encoding="utf-8"?>
 <p:sldLayout xmlns:a="http://schemas.openxmlformats.org/drawingml/2006/main" xmlns:r="http://schemas.openxmlformats.org/officeDocument/2006/relationships" xmlns:p="http://schemas.openxmlformats.org/presentationml/2006/main" matchingName="Picture with Caption" type="picTx">
   <p:cSld name="PICTURE_WITH_CAPTION_TEXT">
     <p:spTree>
@@ -15124,6 +13408,1031 @@
       <p:sp>
         <p:nvSpPr>
           <p:cNvPr id="83" name="Google Shape;83;p12"/>
+          <p:cNvSpPr txBox="1">
+            <a:spLocks noGrp="1"/>
+          </p:cNvSpPr>
+          <p:nvPr>
+            <p:ph type="sldNum" idx="12"/>
+          </p:nvPr>
+        </p:nvSpPr>
+        <p:spPr>
+          <a:xfrm>
+            <a:off x="8610600" y="6356350"/>
+            <a:ext cx="2743200" cy="365100"/>
+          </a:xfrm>
+          <a:prstGeom prst="rect">
+            <a:avLst/>
+          </a:prstGeom>
+          <a:noFill/>
+          <a:ln>
+            <a:noFill/>
+          </a:ln>
+        </p:spPr>
+        <p:txBody>
+          <a:bodyPr spcFirstLastPara="1" wrap="square" lIns="91425" tIns="45700" rIns="91425" bIns="45700" anchor="ctr" anchorCtr="0">
+            <a:noAutofit/>
+          </a:bodyPr>
+          <a:lstStyle>
+            <a:lvl1pPr marL="0" marR="0" lvl="0" indent="0" algn="r" rtl="0">
+              <a:spcBef>
+                <a:spcPts val="0"/>
+              </a:spcBef>
+              <a:buNone/>
+              <a:defRPr sz="1200" b="0" i="0" u="none" strike="noStrike" cap="none">
+                <a:solidFill>
+                  <a:srgbClr val="888888"/>
+                </a:solidFill>
+                <a:latin typeface="Calibri"/>
+                <a:ea typeface="Calibri"/>
+                <a:cs typeface="Calibri"/>
+                <a:sym typeface="Calibri"/>
+              </a:defRPr>
+            </a:lvl1pPr>
+            <a:lvl2pPr marL="0" marR="0" lvl="1" indent="0" algn="r" rtl="0">
+              <a:spcBef>
+                <a:spcPts val="0"/>
+              </a:spcBef>
+              <a:buNone/>
+              <a:defRPr sz="1200" b="0" i="0" u="none" strike="noStrike" cap="none">
+                <a:solidFill>
+                  <a:srgbClr val="888888"/>
+                </a:solidFill>
+                <a:latin typeface="Calibri"/>
+                <a:ea typeface="Calibri"/>
+                <a:cs typeface="Calibri"/>
+                <a:sym typeface="Calibri"/>
+              </a:defRPr>
+            </a:lvl2pPr>
+            <a:lvl3pPr marL="0" marR="0" lvl="2" indent="0" algn="r" rtl="0">
+              <a:spcBef>
+                <a:spcPts val="0"/>
+              </a:spcBef>
+              <a:buNone/>
+              <a:defRPr sz="1200" b="0" i="0" u="none" strike="noStrike" cap="none">
+                <a:solidFill>
+                  <a:srgbClr val="888888"/>
+                </a:solidFill>
+                <a:latin typeface="Calibri"/>
+                <a:ea typeface="Calibri"/>
+                <a:cs typeface="Calibri"/>
+                <a:sym typeface="Calibri"/>
+              </a:defRPr>
+            </a:lvl3pPr>
+            <a:lvl4pPr marL="0" marR="0" lvl="3" indent="0" algn="r" rtl="0">
+              <a:spcBef>
+                <a:spcPts val="0"/>
+              </a:spcBef>
+              <a:buNone/>
+              <a:defRPr sz="1200" b="0" i="0" u="none" strike="noStrike" cap="none">
+                <a:solidFill>
+                  <a:srgbClr val="888888"/>
+                </a:solidFill>
+                <a:latin typeface="Calibri"/>
+                <a:ea typeface="Calibri"/>
+                <a:cs typeface="Calibri"/>
+                <a:sym typeface="Calibri"/>
+              </a:defRPr>
+            </a:lvl4pPr>
+            <a:lvl5pPr marL="0" marR="0" lvl="4" indent="0" algn="r" rtl="0">
+              <a:spcBef>
+                <a:spcPts val="0"/>
+              </a:spcBef>
+              <a:buNone/>
+              <a:defRPr sz="1200" b="0" i="0" u="none" strike="noStrike" cap="none">
+                <a:solidFill>
+                  <a:srgbClr val="888888"/>
+                </a:solidFill>
+                <a:latin typeface="Calibri"/>
+                <a:ea typeface="Calibri"/>
+                <a:cs typeface="Calibri"/>
+                <a:sym typeface="Calibri"/>
+              </a:defRPr>
+            </a:lvl5pPr>
+            <a:lvl6pPr marL="0" marR="0" lvl="5" indent="0" algn="r" rtl="0">
+              <a:spcBef>
+                <a:spcPts val="0"/>
+              </a:spcBef>
+              <a:buNone/>
+              <a:defRPr sz="1200" b="0" i="0" u="none" strike="noStrike" cap="none">
+                <a:solidFill>
+                  <a:srgbClr val="888888"/>
+                </a:solidFill>
+                <a:latin typeface="Calibri"/>
+                <a:ea typeface="Calibri"/>
+                <a:cs typeface="Calibri"/>
+                <a:sym typeface="Calibri"/>
+              </a:defRPr>
+            </a:lvl6pPr>
+            <a:lvl7pPr marL="0" marR="0" lvl="6" indent="0" algn="r" rtl="0">
+              <a:spcBef>
+                <a:spcPts val="0"/>
+              </a:spcBef>
+              <a:buNone/>
+              <a:defRPr sz="1200" b="0" i="0" u="none" strike="noStrike" cap="none">
+                <a:solidFill>
+                  <a:srgbClr val="888888"/>
+                </a:solidFill>
+                <a:latin typeface="Calibri"/>
+                <a:ea typeface="Calibri"/>
+                <a:cs typeface="Calibri"/>
+                <a:sym typeface="Calibri"/>
+              </a:defRPr>
+            </a:lvl7pPr>
+            <a:lvl8pPr marL="0" marR="0" lvl="7" indent="0" algn="r" rtl="0">
+              <a:spcBef>
+                <a:spcPts val="0"/>
+              </a:spcBef>
+              <a:buNone/>
+              <a:defRPr sz="1200" b="0" i="0" u="none" strike="noStrike" cap="none">
+                <a:solidFill>
+                  <a:srgbClr val="888888"/>
+                </a:solidFill>
+                <a:latin typeface="Calibri"/>
+                <a:ea typeface="Calibri"/>
+                <a:cs typeface="Calibri"/>
+                <a:sym typeface="Calibri"/>
+              </a:defRPr>
+            </a:lvl8pPr>
+            <a:lvl9pPr marL="0" marR="0" lvl="8" indent="0" algn="r" rtl="0">
+              <a:spcBef>
+                <a:spcPts val="0"/>
+              </a:spcBef>
+              <a:buNone/>
+              <a:defRPr sz="1200" b="0" i="0" u="none" strike="noStrike" cap="none">
+                <a:solidFill>
+                  <a:srgbClr val="888888"/>
+                </a:solidFill>
+                <a:latin typeface="Calibri"/>
+                <a:ea typeface="Calibri"/>
+                <a:cs typeface="Calibri"/>
+                <a:sym typeface="Calibri"/>
+              </a:defRPr>
+            </a:lvl9pPr>
+          </a:lstStyle>
+          <a:p>
+            <a:pPr marL="0" lvl="0" indent="0">
+              <a:spcBef>
+                <a:spcPts val="0"/>
+              </a:spcBef>
+              <a:spcAft>
+                <a:spcPts val="0"/>
+              </a:spcAft>
+              <a:buNone/>
+            </a:pPr>
+            <a:fld id="{00000000-1234-1234-1234-123412341234}" type="slidenum">
+              <a:rPr lang="en-US"/>
+              <a:t>‹#›</a:t>
+            </a:fld>
+            <a:endParaRPr/>
+          </a:p>
+        </p:txBody>
+      </p:sp>
+    </p:spTree>
+  </p:cSld>
+  <p:clrMapOvr>
+    <a:masterClrMapping/>
+  </p:clrMapOvr>
+</p:sldLayout>
+</file>
+
+<file path=ppt/slideLayouts/slideLayout9.xml><?xml version="1.0" encoding="utf-8"?>
+<p:sldLayout xmlns:a="http://schemas.openxmlformats.org/drawingml/2006/main" xmlns:r="http://schemas.openxmlformats.org/officeDocument/2006/relationships" xmlns:p="http://schemas.openxmlformats.org/presentationml/2006/main" matchingName="Title and Vertical Text" type="vertTx">
+  <p:cSld name="VERTICAL_TEXT">
+    <p:spTree>
+      <p:nvGrpSpPr>
+        <p:cNvPr id="1" name="Shape 84"/>
+        <p:cNvGrpSpPr/>
+        <p:nvPr/>
+      </p:nvGrpSpPr>
+      <p:grpSpPr>
+        <a:xfrm>
+          <a:off x="0" y="0"/>
+          <a:ext cx="0" cy="0"/>
+          <a:chOff x="0" y="0"/>
+          <a:chExt cx="0" cy="0"/>
+        </a:xfrm>
+      </p:grpSpPr>
+      <p:sp>
+        <p:nvSpPr>
+          <p:cNvPr id="85" name="Google Shape;85;p13"/>
+          <p:cNvSpPr txBox="1">
+            <a:spLocks noGrp="1"/>
+          </p:cNvSpPr>
+          <p:nvPr>
+            <p:ph type="title"/>
+          </p:nvPr>
+        </p:nvSpPr>
+        <p:spPr>
+          <a:xfrm>
+            <a:off x="838200" y="365125"/>
+            <a:ext cx="10515600" cy="1325700"/>
+          </a:xfrm>
+          <a:prstGeom prst="rect">
+            <a:avLst/>
+          </a:prstGeom>
+          <a:noFill/>
+          <a:ln>
+            <a:noFill/>
+          </a:ln>
+        </p:spPr>
+        <p:txBody>
+          <a:bodyPr spcFirstLastPara="1" wrap="square" lIns="91425" tIns="45700" rIns="91425" bIns="45700" anchor="ctr" anchorCtr="0"/>
+          <a:lstStyle>
+            <a:lvl1pPr marR="0" lvl="0" algn="l" rtl="0">
+              <a:lnSpc>
+                <a:spcPct val="90000"/>
+              </a:lnSpc>
+              <a:spcBef>
+                <a:spcPts val="0"/>
+              </a:spcBef>
+              <a:spcAft>
+                <a:spcPts val="0"/>
+              </a:spcAft>
+              <a:buClr>
+                <a:schemeClr val="dk1"/>
+              </a:buClr>
+              <a:buSzPts val="4400"/>
+              <a:buFont typeface="Calibri"/>
+              <a:buNone/>
+              <a:defRPr sz="4400" b="0" i="0" u="none" strike="noStrike" cap="none">
+                <a:solidFill>
+                  <a:schemeClr val="dk1"/>
+                </a:solidFill>
+                <a:latin typeface="Calibri"/>
+                <a:ea typeface="Calibri"/>
+                <a:cs typeface="Calibri"/>
+                <a:sym typeface="Calibri"/>
+              </a:defRPr>
+            </a:lvl1pPr>
+            <a:lvl2pPr lvl="1" rtl="0">
+              <a:spcBef>
+                <a:spcPts val="0"/>
+              </a:spcBef>
+              <a:spcAft>
+                <a:spcPts val="0"/>
+              </a:spcAft>
+              <a:buSzPts val="1400"/>
+              <a:buNone/>
+              <a:defRPr sz="1800"/>
+            </a:lvl2pPr>
+            <a:lvl3pPr lvl="2" rtl="0">
+              <a:spcBef>
+                <a:spcPts val="0"/>
+              </a:spcBef>
+              <a:spcAft>
+                <a:spcPts val="0"/>
+              </a:spcAft>
+              <a:buSzPts val="1400"/>
+              <a:buNone/>
+              <a:defRPr sz="1800"/>
+            </a:lvl3pPr>
+            <a:lvl4pPr lvl="3" rtl="0">
+              <a:spcBef>
+                <a:spcPts val="0"/>
+              </a:spcBef>
+              <a:spcAft>
+                <a:spcPts val="0"/>
+              </a:spcAft>
+              <a:buSzPts val="1400"/>
+              <a:buNone/>
+              <a:defRPr sz="1800"/>
+            </a:lvl4pPr>
+            <a:lvl5pPr lvl="4" rtl="0">
+              <a:spcBef>
+                <a:spcPts val="0"/>
+              </a:spcBef>
+              <a:spcAft>
+                <a:spcPts val="0"/>
+              </a:spcAft>
+              <a:buSzPts val="1400"/>
+              <a:buNone/>
+              <a:defRPr sz="1800"/>
+            </a:lvl5pPr>
+            <a:lvl6pPr lvl="5" rtl="0">
+              <a:spcBef>
+                <a:spcPts val="0"/>
+              </a:spcBef>
+              <a:spcAft>
+                <a:spcPts val="0"/>
+              </a:spcAft>
+              <a:buSzPts val="1400"/>
+              <a:buNone/>
+              <a:defRPr sz="1800"/>
+            </a:lvl6pPr>
+            <a:lvl7pPr lvl="6" rtl="0">
+              <a:spcBef>
+                <a:spcPts val="0"/>
+              </a:spcBef>
+              <a:spcAft>
+                <a:spcPts val="0"/>
+              </a:spcAft>
+              <a:buSzPts val="1400"/>
+              <a:buNone/>
+              <a:defRPr sz="1800"/>
+            </a:lvl7pPr>
+            <a:lvl8pPr lvl="7" rtl="0">
+              <a:spcBef>
+                <a:spcPts val="0"/>
+              </a:spcBef>
+              <a:spcAft>
+                <a:spcPts val="0"/>
+              </a:spcAft>
+              <a:buSzPts val="1400"/>
+              <a:buNone/>
+              <a:defRPr sz="1800"/>
+            </a:lvl8pPr>
+            <a:lvl9pPr lvl="8" rtl="0">
+              <a:spcBef>
+                <a:spcPts val="0"/>
+              </a:spcBef>
+              <a:spcAft>
+                <a:spcPts val="0"/>
+              </a:spcAft>
+              <a:buSzPts val="1400"/>
+              <a:buNone/>
+              <a:defRPr sz="1800"/>
+            </a:lvl9pPr>
+          </a:lstStyle>
+          <a:p>
+            <a:endParaRPr/>
+          </a:p>
+        </p:txBody>
+      </p:sp>
+      <p:sp>
+        <p:nvSpPr>
+          <p:cNvPr id="86" name="Google Shape;86;p13"/>
+          <p:cNvSpPr txBox="1">
+            <a:spLocks noGrp="1"/>
+          </p:cNvSpPr>
+          <p:nvPr>
+            <p:ph type="body" idx="1"/>
+          </p:nvPr>
+        </p:nvSpPr>
+        <p:spPr>
+          <a:xfrm rot="5400000">
+            <a:off x="3920400" y="-1256575"/>
+            <a:ext cx="4351200" cy="10515600"/>
+          </a:xfrm>
+          <a:prstGeom prst="rect">
+            <a:avLst/>
+          </a:prstGeom>
+          <a:noFill/>
+          <a:ln>
+            <a:noFill/>
+          </a:ln>
+        </p:spPr>
+        <p:txBody>
+          <a:bodyPr spcFirstLastPara="1" wrap="square" lIns="91425" tIns="45700" rIns="91425" bIns="45700" anchor="t" anchorCtr="0"/>
+          <a:lstStyle>
+            <a:lvl1pPr marL="457200" marR="0" lvl="0" indent="-406400" algn="l" rtl="0">
+              <a:lnSpc>
+                <a:spcPct val="90000"/>
+              </a:lnSpc>
+              <a:spcBef>
+                <a:spcPts val="1000"/>
+              </a:spcBef>
+              <a:spcAft>
+                <a:spcPts val="0"/>
+              </a:spcAft>
+              <a:buClr>
+                <a:schemeClr val="dk1"/>
+              </a:buClr>
+              <a:buSzPts val="2800"/>
+              <a:buFont typeface="Arial"/>
+              <a:buChar char="•"/>
+              <a:defRPr sz="2800" b="0" i="0" u="none" strike="noStrike" cap="none">
+                <a:solidFill>
+                  <a:schemeClr val="dk1"/>
+                </a:solidFill>
+                <a:latin typeface="Calibri"/>
+                <a:ea typeface="Calibri"/>
+                <a:cs typeface="Calibri"/>
+                <a:sym typeface="Calibri"/>
+              </a:defRPr>
+            </a:lvl1pPr>
+            <a:lvl2pPr marL="914400" marR="0" lvl="1" indent="-381000" algn="l" rtl="0">
+              <a:lnSpc>
+                <a:spcPct val="90000"/>
+              </a:lnSpc>
+              <a:spcBef>
+                <a:spcPts val="500"/>
+              </a:spcBef>
+              <a:spcAft>
+                <a:spcPts val="0"/>
+              </a:spcAft>
+              <a:buClr>
+                <a:schemeClr val="dk1"/>
+              </a:buClr>
+              <a:buSzPts val="2400"/>
+              <a:buFont typeface="Arial"/>
+              <a:buChar char="•"/>
+              <a:defRPr sz="2400" b="0" i="0" u="none" strike="noStrike" cap="none">
+                <a:solidFill>
+                  <a:schemeClr val="dk1"/>
+                </a:solidFill>
+                <a:latin typeface="Calibri"/>
+                <a:ea typeface="Calibri"/>
+                <a:cs typeface="Calibri"/>
+                <a:sym typeface="Calibri"/>
+              </a:defRPr>
+            </a:lvl2pPr>
+            <a:lvl3pPr marL="1371600" marR="0" lvl="2" indent="-355600" algn="l" rtl="0">
+              <a:lnSpc>
+                <a:spcPct val="90000"/>
+              </a:lnSpc>
+              <a:spcBef>
+                <a:spcPts val="500"/>
+              </a:spcBef>
+              <a:spcAft>
+                <a:spcPts val="0"/>
+              </a:spcAft>
+              <a:buClr>
+                <a:schemeClr val="dk1"/>
+              </a:buClr>
+              <a:buSzPts val="2000"/>
+              <a:buFont typeface="Arial"/>
+              <a:buChar char="•"/>
+              <a:defRPr sz="2000" b="0" i="0" u="none" strike="noStrike" cap="none">
+                <a:solidFill>
+                  <a:schemeClr val="dk1"/>
+                </a:solidFill>
+                <a:latin typeface="Calibri"/>
+                <a:ea typeface="Calibri"/>
+                <a:cs typeface="Calibri"/>
+                <a:sym typeface="Calibri"/>
+              </a:defRPr>
+            </a:lvl3pPr>
+            <a:lvl4pPr marL="1828800" marR="0" lvl="3" indent="-342900" algn="l" rtl="0">
+              <a:lnSpc>
+                <a:spcPct val="90000"/>
+              </a:lnSpc>
+              <a:spcBef>
+                <a:spcPts val="500"/>
+              </a:spcBef>
+              <a:spcAft>
+                <a:spcPts val="0"/>
+              </a:spcAft>
+              <a:buClr>
+                <a:schemeClr val="dk1"/>
+              </a:buClr>
+              <a:buSzPts val="1800"/>
+              <a:buFont typeface="Arial"/>
+              <a:buChar char="•"/>
+              <a:defRPr sz="1800" b="0" i="0" u="none" strike="noStrike" cap="none">
+                <a:solidFill>
+                  <a:schemeClr val="dk1"/>
+                </a:solidFill>
+                <a:latin typeface="Calibri"/>
+                <a:ea typeface="Calibri"/>
+                <a:cs typeface="Calibri"/>
+                <a:sym typeface="Calibri"/>
+              </a:defRPr>
+            </a:lvl4pPr>
+            <a:lvl5pPr marL="2286000" marR="0" lvl="4" indent="-342900" algn="l" rtl="0">
+              <a:lnSpc>
+                <a:spcPct val="90000"/>
+              </a:lnSpc>
+              <a:spcBef>
+                <a:spcPts val="500"/>
+              </a:spcBef>
+              <a:spcAft>
+                <a:spcPts val="0"/>
+              </a:spcAft>
+              <a:buClr>
+                <a:schemeClr val="dk1"/>
+              </a:buClr>
+              <a:buSzPts val="1800"/>
+              <a:buFont typeface="Arial"/>
+              <a:buChar char="•"/>
+              <a:defRPr sz="1800" b="0" i="0" u="none" strike="noStrike" cap="none">
+                <a:solidFill>
+                  <a:schemeClr val="dk1"/>
+                </a:solidFill>
+                <a:latin typeface="Calibri"/>
+                <a:ea typeface="Calibri"/>
+                <a:cs typeface="Calibri"/>
+                <a:sym typeface="Calibri"/>
+              </a:defRPr>
+            </a:lvl5pPr>
+            <a:lvl6pPr marL="2743200" marR="0" lvl="5" indent="-342900" algn="l" rtl="0">
+              <a:lnSpc>
+                <a:spcPct val="90000"/>
+              </a:lnSpc>
+              <a:spcBef>
+                <a:spcPts val="500"/>
+              </a:spcBef>
+              <a:spcAft>
+                <a:spcPts val="0"/>
+              </a:spcAft>
+              <a:buClr>
+                <a:schemeClr val="dk1"/>
+              </a:buClr>
+              <a:buSzPts val="1800"/>
+              <a:buFont typeface="Arial"/>
+              <a:buChar char="•"/>
+              <a:defRPr sz="1800" b="0" i="0" u="none" strike="noStrike" cap="none">
+                <a:solidFill>
+                  <a:schemeClr val="dk1"/>
+                </a:solidFill>
+                <a:latin typeface="Calibri"/>
+                <a:ea typeface="Calibri"/>
+                <a:cs typeface="Calibri"/>
+                <a:sym typeface="Calibri"/>
+              </a:defRPr>
+            </a:lvl6pPr>
+            <a:lvl7pPr marL="3200400" marR="0" lvl="6" indent="-342900" algn="l" rtl="0">
+              <a:lnSpc>
+                <a:spcPct val="90000"/>
+              </a:lnSpc>
+              <a:spcBef>
+                <a:spcPts val="500"/>
+              </a:spcBef>
+              <a:spcAft>
+                <a:spcPts val="0"/>
+              </a:spcAft>
+              <a:buClr>
+                <a:schemeClr val="dk1"/>
+              </a:buClr>
+              <a:buSzPts val="1800"/>
+              <a:buFont typeface="Arial"/>
+              <a:buChar char="•"/>
+              <a:defRPr sz="1800" b="0" i="0" u="none" strike="noStrike" cap="none">
+                <a:solidFill>
+                  <a:schemeClr val="dk1"/>
+                </a:solidFill>
+                <a:latin typeface="Calibri"/>
+                <a:ea typeface="Calibri"/>
+                <a:cs typeface="Calibri"/>
+                <a:sym typeface="Calibri"/>
+              </a:defRPr>
+            </a:lvl7pPr>
+            <a:lvl8pPr marL="3657600" marR="0" lvl="7" indent="-342900" algn="l" rtl="0">
+              <a:lnSpc>
+                <a:spcPct val="90000"/>
+              </a:lnSpc>
+              <a:spcBef>
+                <a:spcPts val="500"/>
+              </a:spcBef>
+              <a:spcAft>
+                <a:spcPts val="0"/>
+              </a:spcAft>
+              <a:buClr>
+                <a:schemeClr val="dk1"/>
+              </a:buClr>
+              <a:buSzPts val="1800"/>
+              <a:buFont typeface="Arial"/>
+              <a:buChar char="•"/>
+              <a:defRPr sz="1800" b="0" i="0" u="none" strike="noStrike" cap="none">
+                <a:solidFill>
+                  <a:schemeClr val="dk1"/>
+                </a:solidFill>
+                <a:latin typeface="Calibri"/>
+                <a:ea typeface="Calibri"/>
+                <a:cs typeface="Calibri"/>
+                <a:sym typeface="Calibri"/>
+              </a:defRPr>
+            </a:lvl8pPr>
+            <a:lvl9pPr marL="4114800" marR="0" lvl="8" indent="-342900" algn="l" rtl="0">
+              <a:lnSpc>
+                <a:spcPct val="90000"/>
+              </a:lnSpc>
+              <a:spcBef>
+                <a:spcPts val="500"/>
+              </a:spcBef>
+              <a:spcAft>
+                <a:spcPts val="0"/>
+              </a:spcAft>
+              <a:buClr>
+                <a:schemeClr val="dk1"/>
+              </a:buClr>
+              <a:buSzPts val="1800"/>
+              <a:buFont typeface="Arial"/>
+              <a:buChar char="•"/>
+              <a:defRPr sz="1800" b="0" i="0" u="none" strike="noStrike" cap="none">
+                <a:solidFill>
+                  <a:schemeClr val="dk1"/>
+                </a:solidFill>
+                <a:latin typeface="Calibri"/>
+                <a:ea typeface="Calibri"/>
+                <a:cs typeface="Calibri"/>
+                <a:sym typeface="Calibri"/>
+              </a:defRPr>
+            </a:lvl9pPr>
+          </a:lstStyle>
+          <a:p>
+            <a:endParaRPr/>
+          </a:p>
+        </p:txBody>
+      </p:sp>
+      <p:sp>
+        <p:nvSpPr>
+          <p:cNvPr id="87" name="Google Shape;87;p13"/>
+          <p:cNvSpPr txBox="1">
+            <a:spLocks noGrp="1"/>
+          </p:cNvSpPr>
+          <p:nvPr>
+            <p:ph type="dt" idx="10"/>
+          </p:nvPr>
+        </p:nvSpPr>
+        <p:spPr>
+          <a:xfrm>
+            <a:off x="838200" y="6356350"/>
+            <a:ext cx="2743200" cy="365100"/>
+          </a:xfrm>
+          <a:prstGeom prst="rect">
+            <a:avLst/>
+          </a:prstGeom>
+          <a:noFill/>
+          <a:ln>
+            <a:noFill/>
+          </a:ln>
+        </p:spPr>
+        <p:txBody>
+          <a:bodyPr spcFirstLastPara="1" wrap="square" lIns="91425" tIns="45700" rIns="91425" bIns="45700" anchor="ctr" anchorCtr="0"/>
+          <a:lstStyle>
+            <a:lvl1pPr marR="0" lvl="0" algn="l" rtl="0">
+              <a:spcBef>
+                <a:spcPts val="0"/>
+              </a:spcBef>
+              <a:spcAft>
+                <a:spcPts val="0"/>
+              </a:spcAft>
+              <a:buSzPts val="1400"/>
+              <a:buNone/>
+              <a:defRPr sz="1200" b="0" i="0" u="none" strike="noStrike" cap="none">
+                <a:solidFill>
+                  <a:srgbClr val="888888"/>
+                </a:solidFill>
+                <a:latin typeface="Calibri"/>
+                <a:ea typeface="Calibri"/>
+                <a:cs typeface="Calibri"/>
+                <a:sym typeface="Calibri"/>
+              </a:defRPr>
+            </a:lvl1pPr>
+            <a:lvl2pPr marR="0" lvl="1" algn="l" rtl="0">
+              <a:spcBef>
+                <a:spcPts val="0"/>
+              </a:spcBef>
+              <a:spcAft>
+                <a:spcPts val="0"/>
+              </a:spcAft>
+              <a:buSzPts val="1400"/>
+              <a:buNone/>
+              <a:defRPr sz="1800" b="0" i="0" u="none" strike="noStrike" cap="none">
+                <a:solidFill>
+                  <a:schemeClr val="dk1"/>
+                </a:solidFill>
+                <a:latin typeface="Calibri"/>
+                <a:ea typeface="Calibri"/>
+                <a:cs typeface="Calibri"/>
+                <a:sym typeface="Calibri"/>
+              </a:defRPr>
+            </a:lvl2pPr>
+            <a:lvl3pPr marR="0" lvl="2" algn="l" rtl="0">
+              <a:spcBef>
+                <a:spcPts val="0"/>
+              </a:spcBef>
+              <a:spcAft>
+                <a:spcPts val="0"/>
+              </a:spcAft>
+              <a:buSzPts val="1400"/>
+              <a:buNone/>
+              <a:defRPr sz="1800" b="0" i="0" u="none" strike="noStrike" cap="none">
+                <a:solidFill>
+                  <a:schemeClr val="dk1"/>
+                </a:solidFill>
+                <a:latin typeface="Calibri"/>
+                <a:ea typeface="Calibri"/>
+                <a:cs typeface="Calibri"/>
+                <a:sym typeface="Calibri"/>
+              </a:defRPr>
+            </a:lvl3pPr>
+            <a:lvl4pPr marR="0" lvl="3" algn="l" rtl="0">
+              <a:spcBef>
+                <a:spcPts val="0"/>
+              </a:spcBef>
+              <a:spcAft>
+                <a:spcPts val="0"/>
+              </a:spcAft>
+              <a:buSzPts val="1400"/>
+              <a:buNone/>
+              <a:defRPr sz="1800" b="0" i="0" u="none" strike="noStrike" cap="none">
+                <a:solidFill>
+                  <a:schemeClr val="dk1"/>
+                </a:solidFill>
+                <a:latin typeface="Calibri"/>
+                <a:ea typeface="Calibri"/>
+                <a:cs typeface="Calibri"/>
+                <a:sym typeface="Calibri"/>
+              </a:defRPr>
+            </a:lvl4pPr>
+            <a:lvl5pPr marR="0" lvl="4" algn="l" rtl="0">
+              <a:spcBef>
+                <a:spcPts val="0"/>
+              </a:spcBef>
+              <a:spcAft>
+                <a:spcPts val="0"/>
+              </a:spcAft>
+              <a:buSzPts val="1400"/>
+              <a:buNone/>
+              <a:defRPr sz="1800" b="0" i="0" u="none" strike="noStrike" cap="none">
+                <a:solidFill>
+                  <a:schemeClr val="dk1"/>
+                </a:solidFill>
+                <a:latin typeface="Calibri"/>
+                <a:ea typeface="Calibri"/>
+                <a:cs typeface="Calibri"/>
+                <a:sym typeface="Calibri"/>
+              </a:defRPr>
+            </a:lvl5pPr>
+            <a:lvl6pPr marR="0" lvl="5" algn="l" rtl="0">
+              <a:spcBef>
+                <a:spcPts val="0"/>
+              </a:spcBef>
+              <a:spcAft>
+                <a:spcPts val="0"/>
+              </a:spcAft>
+              <a:buSzPts val="1400"/>
+              <a:buNone/>
+              <a:defRPr sz="1800" b="0" i="0" u="none" strike="noStrike" cap="none">
+                <a:solidFill>
+                  <a:schemeClr val="dk1"/>
+                </a:solidFill>
+                <a:latin typeface="Calibri"/>
+                <a:ea typeface="Calibri"/>
+                <a:cs typeface="Calibri"/>
+                <a:sym typeface="Calibri"/>
+              </a:defRPr>
+            </a:lvl6pPr>
+            <a:lvl7pPr marR="0" lvl="6" algn="l" rtl="0">
+              <a:spcBef>
+                <a:spcPts val="0"/>
+              </a:spcBef>
+              <a:spcAft>
+                <a:spcPts val="0"/>
+              </a:spcAft>
+              <a:buSzPts val="1400"/>
+              <a:buNone/>
+              <a:defRPr sz="1800" b="0" i="0" u="none" strike="noStrike" cap="none">
+                <a:solidFill>
+                  <a:schemeClr val="dk1"/>
+                </a:solidFill>
+                <a:latin typeface="Calibri"/>
+                <a:ea typeface="Calibri"/>
+                <a:cs typeface="Calibri"/>
+                <a:sym typeface="Calibri"/>
+              </a:defRPr>
+            </a:lvl7pPr>
+            <a:lvl8pPr marR="0" lvl="7" algn="l" rtl="0">
+              <a:spcBef>
+                <a:spcPts val="0"/>
+              </a:spcBef>
+              <a:spcAft>
+                <a:spcPts val="0"/>
+              </a:spcAft>
+              <a:buSzPts val="1400"/>
+              <a:buNone/>
+              <a:defRPr sz="1800" b="0" i="0" u="none" strike="noStrike" cap="none">
+                <a:solidFill>
+                  <a:schemeClr val="dk1"/>
+                </a:solidFill>
+                <a:latin typeface="Calibri"/>
+                <a:ea typeface="Calibri"/>
+                <a:cs typeface="Calibri"/>
+                <a:sym typeface="Calibri"/>
+              </a:defRPr>
+            </a:lvl8pPr>
+            <a:lvl9pPr marR="0" lvl="8" algn="l" rtl="0">
+              <a:spcBef>
+                <a:spcPts val="0"/>
+              </a:spcBef>
+              <a:spcAft>
+                <a:spcPts val="0"/>
+              </a:spcAft>
+              <a:buSzPts val="1400"/>
+              <a:buNone/>
+              <a:defRPr sz="1800" b="0" i="0" u="none" strike="noStrike" cap="none">
+                <a:solidFill>
+                  <a:schemeClr val="dk1"/>
+                </a:solidFill>
+                <a:latin typeface="Calibri"/>
+                <a:ea typeface="Calibri"/>
+                <a:cs typeface="Calibri"/>
+                <a:sym typeface="Calibri"/>
+              </a:defRPr>
+            </a:lvl9pPr>
+          </a:lstStyle>
+          <a:p>
+            <a:endParaRPr/>
+          </a:p>
+        </p:txBody>
+      </p:sp>
+      <p:sp>
+        <p:nvSpPr>
+          <p:cNvPr id="88" name="Google Shape;88;p13"/>
+          <p:cNvSpPr txBox="1">
+            <a:spLocks noGrp="1"/>
+          </p:cNvSpPr>
+          <p:nvPr>
+            <p:ph type="ftr" idx="11"/>
+          </p:nvPr>
+        </p:nvSpPr>
+        <p:spPr>
+          <a:xfrm>
+            <a:off x="4038600" y="6356350"/>
+            <a:ext cx="4114800" cy="365100"/>
+          </a:xfrm>
+          <a:prstGeom prst="rect">
+            <a:avLst/>
+          </a:prstGeom>
+          <a:noFill/>
+          <a:ln>
+            <a:noFill/>
+          </a:ln>
+        </p:spPr>
+        <p:txBody>
+          <a:bodyPr spcFirstLastPara="1" wrap="square" lIns="91425" tIns="45700" rIns="91425" bIns="45700" anchor="ctr" anchorCtr="0"/>
+          <a:lstStyle>
+            <a:lvl1pPr marR="0" lvl="0" algn="ctr" rtl="0">
+              <a:spcBef>
+                <a:spcPts val="0"/>
+              </a:spcBef>
+              <a:spcAft>
+                <a:spcPts val="0"/>
+              </a:spcAft>
+              <a:buSzPts val="1400"/>
+              <a:buNone/>
+              <a:defRPr sz="1200" b="0" i="0" u="none" strike="noStrike" cap="none">
+                <a:solidFill>
+                  <a:srgbClr val="888888"/>
+                </a:solidFill>
+                <a:latin typeface="Calibri"/>
+                <a:ea typeface="Calibri"/>
+                <a:cs typeface="Calibri"/>
+                <a:sym typeface="Calibri"/>
+              </a:defRPr>
+            </a:lvl1pPr>
+            <a:lvl2pPr marR="0" lvl="1" algn="l" rtl="0">
+              <a:spcBef>
+                <a:spcPts val="0"/>
+              </a:spcBef>
+              <a:spcAft>
+                <a:spcPts val="0"/>
+              </a:spcAft>
+              <a:buSzPts val="1400"/>
+              <a:buNone/>
+              <a:defRPr sz="1800" b="0" i="0" u="none" strike="noStrike" cap="none">
+                <a:solidFill>
+                  <a:schemeClr val="dk1"/>
+                </a:solidFill>
+                <a:latin typeface="Calibri"/>
+                <a:ea typeface="Calibri"/>
+                <a:cs typeface="Calibri"/>
+                <a:sym typeface="Calibri"/>
+              </a:defRPr>
+            </a:lvl2pPr>
+            <a:lvl3pPr marR="0" lvl="2" algn="l" rtl="0">
+              <a:spcBef>
+                <a:spcPts val="0"/>
+              </a:spcBef>
+              <a:spcAft>
+                <a:spcPts val="0"/>
+              </a:spcAft>
+              <a:buSzPts val="1400"/>
+              <a:buNone/>
+              <a:defRPr sz="1800" b="0" i="0" u="none" strike="noStrike" cap="none">
+                <a:solidFill>
+                  <a:schemeClr val="dk1"/>
+                </a:solidFill>
+                <a:latin typeface="Calibri"/>
+                <a:ea typeface="Calibri"/>
+                <a:cs typeface="Calibri"/>
+                <a:sym typeface="Calibri"/>
+              </a:defRPr>
+            </a:lvl3pPr>
+            <a:lvl4pPr marR="0" lvl="3" algn="l" rtl="0">
+              <a:spcBef>
+                <a:spcPts val="0"/>
+              </a:spcBef>
+              <a:spcAft>
+                <a:spcPts val="0"/>
+              </a:spcAft>
+              <a:buSzPts val="1400"/>
+              <a:buNone/>
+              <a:defRPr sz="1800" b="0" i="0" u="none" strike="noStrike" cap="none">
+                <a:solidFill>
+                  <a:schemeClr val="dk1"/>
+                </a:solidFill>
+                <a:latin typeface="Calibri"/>
+                <a:ea typeface="Calibri"/>
+                <a:cs typeface="Calibri"/>
+                <a:sym typeface="Calibri"/>
+              </a:defRPr>
+            </a:lvl4pPr>
+            <a:lvl5pPr marR="0" lvl="4" algn="l" rtl="0">
+              <a:spcBef>
+                <a:spcPts val="0"/>
+              </a:spcBef>
+              <a:spcAft>
+                <a:spcPts val="0"/>
+              </a:spcAft>
+              <a:buSzPts val="1400"/>
+              <a:buNone/>
+              <a:defRPr sz="1800" b="0" i="0" u="none" strike="noStrike" cap="none">
+                <a:solidFill>
+                  <a:schemeClr val="dk1"/>
+                </a:solidFill>
+                <a:latin typeface="Calibri"/>
+                <a:ea typeface="Calibri"/>
+                <a:cs typeface="Calibri"/>
+                <a:sym typeface="Calibri"/>
+              </a:defRPr>
+            </a:lvl5pPr>
+            <a:lvl6pPr marR="0" lvl="5" algn="l" rtl="0">
+              <a:spcBef>
+                <a:spcPts val="0"/>
+              </a:spcBef>
+              <a:spcAft>
+                <a:spcPts val="0"/>
+              </a:spcAft>
+              <a:buSzPts val="1400"/>
+              <a:buNone/>
+              <a:defRPr sz="1800" b="0" i="0" u="none" strike="noStrike" cap="none">
+                <a:solidFill>
+                  <a:schemeClr val="dk1"/>
+                </a:solidFill>
+                <a:latin typeface="Calibri"/>
+                <a:ea typeface="Calibri"/>
+                <a:cs typeface="Calibri"/>
+                <a:sym typeface="Calibri"/>
+              </a:defRPr>
+            </a:lvl6pPr>
+            <a:lvl7pPr marR="0" lvl="6" algn="l" rtl="0">
+              <a:spcBef>
+                <a:spcPts val="0"/>
+              </a:spcBef>
+              <a:spcAft>
+                <a:spcPts val="0"/>
+              </a:spcAft>
+              <a:buSzPts val="1400"/>
+              <a:buNone/>
+              <a:defRPr sz="1800" b="0" i="0" u="none" strike="noStrike" cap="none">
+                <a:solidFill>
+                  <a:schemeClr val="dk1"/>
+                </a:solidFill>
+                <a:latin typeface="Calibri"/>
+                <a:ea typeface="Calibri"/>
+                <a:cs typeface="Calibri"/>
+                <a:sym typeface="Calibri"/>
+              </a:defRPr>
+            </a:lvl7pPr>
+            <a:lvl8pPr marR="0" lvl="7" algn="l" rtl="0">
+              <a:spcBef>
+                <a:spcPts val="0"/>
+              </a:spcBef>
+              <a:spcAft>
+                <a:spcPts val="0"/>
+              </a:spcAft>
+              <a:buSzPts val="1400"/>
+              <a:buNone/>
+              <a:defRPr sz="1800" b="0" i="0" u="none" strike="noStrike" cap="none">
+                <a:solidFill>
+                  <a:schemeClr val="dk1"/>
+                </a:solidFill>
+                <a:latin typeface="Calibri"/>
+                <a:ea typeface="Calibri"/>
+                <a:cs typeface="Calibri"/>
+                <a:sym typeface="Calibri"/>
+              </a:defRPr>
+            </a:lvl8pPr>
+            <a:lvl9pPr marR="0" lvl="8" algn="l" rtl="0">
+              <a:spcBef>
+                <a:spcPts val="0"/>
+              </a:spcBef>
+              <a:spcAft>
+                <a:spcPts val="0"/>
+              </a:spcAft>
+              <a:buSzPts val="1400"/>
+              <a:buNone/>
+              <a:defRPr sz="1800" b="0" i="0" u="none" strike="noStrike" cap="none">
+                <a:solidFill>
+                  <a:schemeClr val="dk1"/>
+                </a:solidFill>
+                <a:latin typeface="Calibri"/>
+                <a:ea typeface="Calibri"/>
+                <a:cs typeface="Calibri"/>
+                <a:sym typeface="Calibri"/>
+              </a:defRPr>
+            </a:lvl9pPr>
+          </a:lstStyle>
+          <a:p>
+            <a:endParaRPr/>
+          </a:p>
+        </p:txBody>
+      </p:sp>
+      <p:sp>
+        <p:nvSpPr>
+          <p:cNvPr id="89" name="Google Shape;89;p13"/>
           <p:cNvSpPr txBox="1">
             <a:spLocks noGrp="1"/>
           </p:cNvSpPr>
@@ -18065,15 +17374,14 @@
   <p:clrMap bg1="lt1" tx1="dk1" bg2="dk2" tx2="lt2" accent1="accent1" accent2="accent2" accent3="accent3" accent4="accent4" accent5="accent5" accent6="accent6" hlink="hlink" folHlink="folHlink"/>
   <p:sldLayoutIdLst>
     <p:sldLayoutId id="2147483649" r:id="rId1"/>
-    <p:sldLayoutId id="2147483651" r:id="rId2"/>
-    <p:sldLayoutId id="2147483652" r:id="rId3"/>
-    <p:sldLayoutId id="2147483653" r:id="rId4"/>
-    <p:sldLayoutId id="2147483654" r:id="rId5"/>
-    <p:sldLayoutId id="2147483655" r:id="rId6"/>
-    <p:sldLayoutId id="2147483656" r:id="rId7"/>
-    <p:sldLayoutId id="2147483657" r:id="rId8"/>
-    <p:sldLayoutId id="2147483658" r:id="rId9"/>
-    <p:sldLayoutId id="2147483659" r:id="rId10"/>
+    <p:sldLayoutId id="2147483652" r:id="rId2"/>
+    <p:sldLayoutId id="2147483653" r:id="rId3"/>
+    <p:sldLayoutId id="2147483654" r:id="rId4"/>
+    <p:sldLayoutId id="2147483655" r:id="rId5"/>
+    <p:sldLayoutId id="2147483656" r:id="rId6"/>
+    <p:sldLayoutId id="2147483657" r:id="rId7"/>
+    <p:sldLayoutId id="2147483658" r:id="rId8"/>
+    <p:sldLayoutId id="2147483659" r:id="rId9"/>
   </p:sldLayoutIdLst>
   <p:hf sldNum="0" hdr="0" ftr="0" dt="0"/>
   <p:txStyles>
@@ -22094,6 +21402,748 @@
     <p:extLst>
       <p:ext uri="{BB962C8B-B14F-4D97-AF65-F5344CB8AC3E}">
         <p14:creationId xmlns:p14="http://schemas.microsoft.com/office/powerpoint/2010/main" val="3116038192"/>
+      </p:ext>
+    </p:extLst>
+  </p:cSld>
+  <p:clrMapOvr>
+    <a:masterClrMapping/>
+  </p:clrMapOvr>
+</p:sld>
+</file>
+
+<file path=ppt/slides/slide9.xml><?xml version="1.0" encoding="utf-8"?>
+<p:sld xmlns:a="http://schemas.openxmlformats.org/drawingml/2006/main" xmlns:r="http://schemas.openxmlformats.org/officeDocument/2006/relationships" xmlns:p="http://schemas.openxmlformats.org/presentationml/2006/main">
+  <p:cSld>
+    <p:bg>
+      <p:bgPr>
+        <a:solidFill>
+          <a:schemeClr val="lt1"/>
+        </a:solidFill>
+        <a:effectLst/>
+      </p:bgPr>
+    </p:bg>
+    <p:spTree>
+      <p:nvGrpSpPr>
+        <p:cNvPr id="1" name="Shape 121"/>
+        <p:cNvGrpSpPr/>
+        <p:nvPr/>
+      </p:nvGrpSpPr>
+      <p:grpSpPr>
+        <a:xfrm>
+          <a:off x="0" y="0"/>
+          <a:ext cx="0" cy="0"/>
+          <a:chOff x="0" y="0"/>
+          <a:chExt cx="0" cy="0"/>
+        </a:xfrm>
+      </p:grpSpPr>
+      <p:sp>
+        <p:nvSpPr>
+          <p:cNvPr id="122" name="Google Shape;122;p17"/>
+          <p:cNvSpPr/>
+          <p:nvPr/>
+        </p:nvSpPr>
+        <p:spPr>
+          <a:xfrm>
+            <a:off x="321564" y="320040"/>
+            <a:ext cx="11548800" cy="6217800"/>
+          </a:xfrm>
+          <a:prstGeom prst="rect">
+            <a:avLst/>
+          </a:prstGeom>
+          <a:solidFill>
+            <a:schemeClr val="dk1">
+              <a:alpha val="7840"/>
+            </a:schemeClr>
+          </a:solidFill>
+          <a:ln>
+            <a:noFill/>
+          </a:ln>
+        </p:spPr>
+        <p:txBody>
+          <a:bodyPr spcFirstLastPara="1" wrap="square" lIns="91425" tIns="45700" rIns="91425" bIns="45700" anchor="ctr" anchorCtr="0">
+            <a:noAutofit/>
+          </a:bodyPr>
+          <a:lstStyle/>
+          <a:p>
+            <a:pPr marL="0" marR="0" lvl="0" indent="0" algn="ctr" rtl="0">
+              <a:spcBef>
+                <a:spcPts val="0"/>
+              </a:spcBef>
+              <a:spcAft>
+                <a:spcPts val="0"/>
+              </a:spcAft>
+              <a:buNone/>
+            </a:pPr>
+            <a:endParaRPr sz="1800" b="0" i="0" u="none" strike="noStrike" cap="none">
+              <a:solidFill>
+                <a:schemeClr val="lt1"/>
+              </a:solidFill>
+              <a:latin typeface="Calibri"/>
+              <a:ea typeface="Calibri"/>
+              <a:cs typeface="Calibri"/>
+              <a:sym typeface="Calibri"/>
+            </a:endParaRPr>
+          </a:p>
+        </p:txBody>
+      </p:sp>
+      <p:sp>
+        <p:nvSpPr>
+          <p:cNvPr id="123" name="Google Shape;123;p17"/>
+          <p:cNvSpPr txBox="1"/>
+          <p:nvPr/>
+        </p:nvSpPr>
+        <p:spPr>
+          <a:xfrm>
+            <a:off x="838200" y="963877"/>
+            <a:ext cx="3494362" cy="4930246"/>
+          </a:xfrm>
+          <a:prstGeom prst="rect">
+            <a:avLst/>
+          </a:prstGeom>
+          <a:noFill/>
+          <a:ln>
+            <a:noFill/>
+          </a:ln>
+        </p:spPr>
+        <p:txBody>
+          <a:bodyPr spcFirstLastPara="1" wrap="square" lIns="91425" tIns="45700" rIns="91425" bIns="45700" anchor="ctr" anchorCtr="0">
+            <a:noAutofit/>
+          </a:bodyPr>
+          <a:lstStyle/>
+          <a:p>
+            <a:pPr marL="0" marR="0" lvl="0" indent="0" algn="r" rtl="0">
+              <a:lnSpc>
+                <a:spcPct val="90000"/>
+              </a:lnSpc>
+              <a:spcBef>
+                <a:spcPts val="0"/>
+              </a:spcBef>
+              <a:spcAft>
+                <a:spcPts val="0"/>
+              </a:spcAft>
+              <a:buNone/>
+            </a:pPr>
+            <a:r>
+              <a:rPr lang="en-US" sz="4400" b="0" i="0" u="none" strike="noStrike" cap="none" dirty="0">
+                <a:solidFill>
+                  <a:schemeClr val="accent1"/>
+                </a:solidFill>
+                <a:latin typeface="Calibri"/>
+                <a:ea typeface="Calibri"/>
+                <a:cs typeface="Calibri"/>
+                <a:sym typeface="Calibri"/>
+              </a:rPr>
+              <a:t>Course Overview</a:t>
+            </a:r>
+            <a:endParaRPr sz="4400" b="0" i="0" u="none" strike="noStrike" cap="none" dirty="0">
+              <a:solidFill>
+                <a:schemeClr val="accent1"/>
+              </a:solidFill>
+              <a:latin typeface="Calibri"/>
+              <a:ea typeface="Calibri"/>
+              <a:cs typeface="Calibri"/>
+              <a:sym typeface="Calibri"/>
+            </a:endParaRPr>
+          </a:p>
+        </p:txBody>
+      </p:sp>
+      <p:cxnSp>
+        <p:nvCxnSpPr>
+          <p:cNvPr id="124" name="Google Shape;124;p17"/>
+          <p:cNvCxnSpPr/>
+          <p:nvPr/>
+        </p:nvCxnSpPr>
+        <p:spPr>
+          <a:xfrm>
+            <a:off x="4654296" y="2057400"/>
+            <a:ext cx="0" cy="2743200"/>
+          </a:xfrm>
+          <a:prstGeom prst="straightConnector1">
+            <a:avLst/>
+          </a:prstGeom>
+          <a:noFill/>
+          <a:ln w="19050" cap="flat" cmpd="sng">
+            <a:solidFill>
+              <a:srgbClr val="262626"/>
+            </a:solidFill>
+            <a:prstDash val="solid"/>
+            <a:miter lim="800000"/>
+            <a:headEnd type="none" w="sm" len="sm"/>
+            <a:tailEnd type="none" w="sm" len="sm"/>
+          </a:ln>
+        </p:spPr>
+      </p:cxnSp>
+      <p:sp>
+        <p:nvSpPr>
+          <p:cNvPr id="125" name="Google Shape;125;p17"/>
+          <p:cNvSpPr txBox="1"/>
+          <p:nvPr/>
+        </p:nvSpPr>
+        <p:spPr>
+          <a:xfrm>
+            <a:off x="4976031" y="1607594"/>
+            <a:ext cx="6377769" cy="4930246"/>
+          </a:xfrm>
+          <a:prstGeom prst="rect">
+            <a:avLst/>
+          </a:prstGeom>
+          <a:noFill/>
+          <a:ln>
+            <a:noFill/>
+          </a:ln>
+        </p:spPr>
+        <p:txBody>
+          <a:bodyPr spcFirstLastPara="1" wrap="square" lIns="91425" tIns="45700" rIns="91425" bIns="45700" anchor="ctr" anchorCtr="0">
+            <a:noAutofit/>
+          </a:bodyPr>
+          <a:lstStyle/>
+          <a:p>
+            <a:pPr marL="285750" marR="0" lvl="0" indent="-228600" algn="l" rtl="0">
+              <a:lnSpc>
+                <a:spcPct val="90000"/>
+              </a:lnSpc>
+              <a:spcBef>
+                <a:spcPts val="0"/>
+              </a:spcBef>
+              <a:spcAft>
+                <a:spcPts val="0"/>
+              </a:spcAft>
+              <a:buClr>
+                <a:schemeClr val="dk1"/>
+              </a:buClr>
+              <a:buSzPts val="2400"/>
+              <a:buFont typeface="Arial"/>
+              <a:buChar char="•"/>
+            </a:pPr>
+            <a:endParaRPr dirty="0"/>
+          </a:p>
+          <a:p>
+            <a:pPr marL="552450" indent="-342900">
+              <a:lnSpc>
+                <a:spcPct val="90000"/>
+              </a:lnSpc>
+              <a:spcBef>
+                <a:spcPts val="600"/>
+              </a:spcBef>
+              <a:buClr>
+                <a:schemeClr val="dk1"/>
+              </a:buClr>
+              <a:buSzPts val="2400"/>
+              <a:buFont typeface="Arial" panose="020B0604020202020204" pitchFamily="34" charset="0"/>
+              <a:buChar char="•"/>
+            </a:pPr>
+            <a:r>
+              <a:rPr lang="en-NZ" sz="2400" dirty="0">
+                <a:latin typeface="Calibri" panose="020F0502020204030204" pitchFamily="34" charset="0"/>
+                <a:cs typeface="Calibri" panose="020F0502020204030204" pitchFamily="34" charset="0"/>
+              </a:rPr>
+              <a:t>XCode, Debugging, Source Control </a:t>
+            </a:r>
+          </a:p>
+          <a:p>
+            <a:pPr marL="552450" indent="-342900">
+              <a:lnSpc>
+                <a:spcPct val="90000"/>
+              </a:lnSpc>
+              <a:spcBef>
+                <a:spcPts val="600"/>
+              </a:spcBef>
+              <a:buClr>
+                <a:schemeClr val="dk1"/>
+              </a:buClr>
+              <a:buSzPts val="2400"/>
+              <a:buFont typeface="Arial" panose="020B0604020202020204" pitchFamily="34" charset="0"/>
+              <a:buChar char="•"/>
+            </a:pPr>
+            <a:r>
+              <a:rPr lang="en-NZ" sz="2400" dirty="0">
+                <a:latin typeface="Calibri" panose="020F0502020204030204" pitchFamily="34" charset="0"/>
+                <a:cs typeface="Calibri" panose="020F0502020204030204" pitchFamily="34" charset="0"/>
+              </a:rPr>
+              <a:t>Classes, Collections, Loops</a:t>
+            </a:r>
+          </a:p>
+          <a:p>
+            <a:pPr marL="552450" marR="0" lvl="0" indent="-342900" algn="l" rtl="0">
+              <a:lnSpc>
+                <a:spcPct val="90000"/>
+              </a:lnSpc>
+              <a:spcBef>
+                <a:spcPts val="600"/>
+              </a:spcBef>
+              <a:spcAft>
+                <a:spcPts val="0"/>
+              </a:spcAft>
+              <a:buClr>
+                <a:schemeClr val="dk1"/>
+              </a:buClr>
+              <a:buSzPts val="2400"/>
+              <a:buFont typeface="Arial" panose="020B0604020202020204" pitchFamily="34" charset="0"/>
+              <a:buChar char="•"/>
+            </a:pPr>
+            <a:r>
+              <a:rPr lang="en-US" sz="2400" b="0" i="0" u="none" strike="noStrike" cap="none" dirty="0">
+                <a:solidFill>
+                  <a:schemeClr val="dk1"/>
+                </a:solidFill>
+                <a:latin typeface="Calibri"/>
+                <a:ea typeface="Calibri"/>
+                <a:cs typeface="Calibri"/>
+                <a:sym typeface="Calibri"/>
+              </a:rPr>
+              <a:t>Displa</a:t>
+            </a:r>
+            <a:r>
+              <a:rPr lang="en-US" sz="2400" dirty="0">
+                <a:solidFill>
+                  <a:schemeClr val="dk1"/>
+                </a:solidFill>
+                <a:latin typeface="Calibri"/>
+                <a:ea typeface="Calibri"/>
+                <a:cs typeface="Calibri"/>
+                <a:sym typeface="Calibri"/>
+              </a:rPr>
+              <a:t>y Data, Auto Layout</a:t>
+            </a:r>
+          </a:p>
+          <a:p>
+            <a:pPr marL="552450" marR="0" lvl="0" indent="-342900" algn="l" rtl="0">
+              <a:lnSpc>
+                <a:spcPct val="90000"/>
+              </a:lnSpc>
+              <a:spcBef>
+                <a:spcPts val="600"/>
+              </a:spcBef>
+              <a:spcAft>
+                <a:spcPts val="0"/>
+              </a:spcAft>
+              <a:buClr>
+                <a:schemeClr val="dk1"/>
+              </a:buClr>
+              <a:buSzPts val="2400"/>
+              <a:buFont typeface="Arial" panose="020B0604020202020204" pitchFamily="34" charset="0"/>
+              <a:buChar char="•"/>
+            </a:pPr>
+            <a:r>
+              <a:rPr lang="en-US" sz="2400" b="0" i="0" u="none" strike="noStrike" cap="none" dirty="0" err="1">
+                <a:solidFill>
+                  <a:schemeClr val="dk1"/>
+                </a:solidFill>
+                <a:latin typeface="Calibri"/>
+                <a:ea typeface="Calibri"/>
+                <a:cs typeface="Calibri"/>
+                <a:sym typeface="Calibri"/>
+              </a:rPr>
+              <a:t>Option</a:t>
+            </a:r>
+            <a:r>
+              <a:rPr lang="en-US" sz="2400" dirty="0" err="1">
+                <a:solidFill>
+                  <a:schemeClr val="dk1"/>
+                </a:solidFill>
+                <a:latin typeface="Calibri"/>
+                <a:ea typeface="Calibri"/>
+                <a:cs typeface="Calibri"/>
+                <a:sym typeface="Calibri"/>
+              </a:rPr>
+              <a:t>als</a:t>
+            </a:r>
+            <a:r>
+              <a:rPr lang="en-US" sz="2400" dirty="0">
+                <a:solidFill>
+                  <a:schemeClr val="dk1"/>
+                </a:solidFill>
+                <a:latin typeface="Calibri"/>
+                <a:ea typeface="Calibri"/>
+                <a:cs typeface="Calibri"/>
+                <a:sym typeface="Calibri"/>
+              </a:rPr>
+              <a:t>, Type casting</a:t>
+            </a:r>
+          </a:p>
+          <a:p>
+            <a:pPr marL="552450" marR="0" lvl="0" indent="-342900" algn="l" rtl="0">
+              <a:lnSpc>
+                <a:spcPct val="90000"/>
+              </a:lnSpc>
+              <a:spcBef>
+                <a:spcPts val="600"/>
+              </a:spcBef>
+              <a:spcAft>
+                <a:spcPts val="0"/>
+              </a:spcAft>
+              <a:buClr>
+                <a:schemeClr val="dk1"/>
+              </a:buClr>
+              <a:buSzPts val="2400"/>
+              <a:buFont typeface="Arial" panose="020B0604020202020204" pitchFamily="34" charset="0"/>
+              <a:buChar char="•"/>
+            </a:pPr>
+            <a:r>
+              <a:rPr lang="en-US" sz="2400" b="0" i="0" u="none" strike="noStrike" cap="none" dirty="0">
+                <a:solidFill>
+                  <a:schemeClr val="dk1"/>
+                </a:solidFill>
+                <a:latin typeface="Calibri"/>
+                <a:ea typeface="Calibri"/>
+                <a:cs typeface="Calibri"/>
+                <a:sym typeface="Calibri"/>
+              </a:rPr>
+              <a:t>Guard</a:t>
+            </a:r>
+            <a:r>
+              <a:rPr lang="en-US" sz="2400" dirty="0">
+                <a:solidFill>
+                  <a:schemeClr val="dk1"/>
+                </a:solidFill>
+                <a:latin typeface="Calibri"/>
+                <a:ea typeface="Calibri"/>
+                <a:cs typeface="Calibri"/>
+                <a:sym typeface="Calibri"/>
+              </a:rPr>
+              <a:t> statements, API structure </a:t>
+            </a:r>
+          </a:p>
+          <a:p>
+            <a:pPr marL="552450" marR="0" lvl="0" indent="-342900" algn="l" rtl="0">
+              <a:lnSpc>
+                <a:spcPct val="90000"/>
+              </a:lnSpc>
+              <a:spcBef>
+                <a:spcPts val="600"/>
+              </a:spcBef>
+              <a:spcAft>
+                <a:spcPts val="0"/>
+              </a:spcAft>
+              <a:buClr>
+                <a:schemeClr val="dk1"/>
+              </a:buClr>
+              <a:buSzPts val="2400"/>
+              <a:buFont typeface="Arial" panose="020B0604020202020204" pitchFamily="34" charset="0"/>
+              <a:buChar char="•"/>
+            </a:pPr>
+            <a:r>
+              <a:rPr lang="en-US" sz="2400" b="0" i="0" u="none" strike="noStrike" cap="none" dirty="0">
+                <a:solidFill>
+                  <a:schemeClr val="dk1"/>
+                </a:solidFill>
+                <a:latin typeface="Calibri"/>
+                <a:ea typeface="Calibri"/>
+                <a:cs typeface="Calibri"/>
+                <a:sym typeface="Calibri"/>
+              </a:rPr>
+              <a:t>Scope</a:t>
+            </a:r>
+            <a:r>
+              <a:rPr lang="en-US" sz="2400" dirty="0">
+                <a:solidFill>
+                  <a:schemeClr val="dk1"/>
+                </a:solidFill>
+                <a:latin typeface="Calibri"/>
+                <a:ea typeface="Calibri"/>
+                <a:cs typeface="Calibri"/>
+                <a:sym typeface="Calibri"/>
+              </a:rPr>
+              <a:t>, Segue </a:t>
+            </a:r>
+            <a:r>
+              <a:rPr lang="en-US" sz="2400" dirty="0" err="1">
+                <a:solidFill>
+                  <a:schemeClr val="dk1"/>
+                </a:solidFill>
+                <a:latin typeface="Calibri"/>
+                <a:ea typeface="Calibri"/>
+                <a:cs typeface="Calibri"/>
+                <a:sym typeface="Calibri"/>
+              </a:rPr>
+              <a:t>Enums</a:t>
+            </a:r>
+            <a:endParaRPr lang="en-US" sz="2400" dirty="0">
+              <a:solidFill>
+                <a:schemeClr val="dk1"/>
+              </a:solidFill>
+              <a:latin typeface="Calibri"/>
+              <a:ea typeface="Calibri"/>
+              <a:cs typeface="Calibri"/>
+              <a:sym typeface="Calibri"/>
+            </a:endParaRPr>
+          </a:p>
+          <a:p>
+            <a:pPr marL="552450" marR="0" lvl="0" indent="-342900" algn="l" rtl="0">
+              <a:lnSpc>
+                <a:spcPct val="90000"/>
+              </a:lnSpc>
+              <a:spcBef>
+                <a:spcPts val="600"/>
+              </a:spcBef>
+              <a:spcAft>
+                <a:spcPts val="0"/>
+              </a:spcAft>
+              <a:buClr>
+                <a:schemeClr val="dk1"/>
+              </a:buClr>
+              <a:buSzPts val="2400"/>
+              <a:buFont typeface="Arial" panose="020B0604020202020204" pitchFamily="34" charset="0"/>
+              <a:buChar char="•"/>
+            </a:pPr>
+            <a:r>
+              <a:rPr lang="en-US" sz="2400" dirty="0">
+                <a:solidFill>
+                  <a:schemeClr val="dk1"/>
+                </a:solidFill>
+                <a:latin typeface="Calibri"/>
+                <a:ea typeface="Calibri"/>
+                <a:cs typeface="Calibri"/>
+                <a:sym typeface="Calibri"/>
+              </a:rPr>
+              <a:t>Tab bar controller, View controller</a:t>
+            </a:r>
+          </a:p>
+          <a:p>
+            <a:pPr marL="552450" marR="0" lvl="0" indent="-342900" algn="l" rtl="0">
+              <a:lnSpc>
+                <a:spcPct val="90000"/>
+              </a:lnSpc>
+              <a:spcBef>
+                <a:spcPts val="600"/>
+              </a:spcBef>
+              <a:spcAft>
+                <a:spcPts val="0"/>
+              </a:spcAft>
+              <a:buClr>
+                <a:schemeClr val="dk1"/>
+              </a:buClr>
+              <a:buSzPts val="2400"/>
+              <a:buFont typeface="Arial" panose="020B0604020202020204" pitchFamily="34" charset="0"/>
+              <a:buChar char="•"/>
+            </a:pPr>
+            <a:r>
+              <a:rPr lang="en-US" sz="2400" dirty="0">
+                <a:solidFill>
+                  <a:schemeClr val="dk1"/>
+                </a:solidFill>
+                <a:latin typeface="Calibri"/>
+                <a:ea typeface="Calibri"/>
+                <a:cs typeface="Calibri"/>
+                <a:sym typeface="Calibri"/>
+              </a:rPr>
+              <a:t>Protocols, App lifecycle</a:t>
+            </a:r>
+          </a:p>
+          <a:p>
+            <a:pPr marL="552450" marR="0" lvl="0" indent="-342900" algn="l" rtl="0">
+              <a:lnSpc>
+                <a:spcPct val="90000"/>
+              </a:lnSpc>
+              <a:spcBef>
+                <a:spcPts val="600"/>
+              </a:spcBef>
+              <a:spcAft>
+                <a:spcPts val="0"/>
+              </a:spcAft>
+              <a:buClr>
+                <a:schemeClr val="dk1"/>
+              </a:buClr>
+              <a:buSzPts val="2400"/>
+              <a:buFont typeface="Arial" panose="020B0604020202020204" pitchFamily="34" charset="0"/>
+              <a:buChar char="•"/>
+            </a:pPr>
+            <a:r>
+              <a:rPr lang="en-US" sz="2400" dirty="0">
+                <a:solidFill>
+                  <a:schemeClr val="dk1"/>
+                </a:solidFill>
+                <a:latin typeface="Calibri"/>
+                <a:ea typeface="Calibri"/>
+                <a:cs typeface="Calibri"/>
+                <a:sym typeface="Calibri"/>
+              </a:rPr>
+              <a:t>Scroll view, Table view</a:t>
+            </a:r>
+          </a:p>
+          <a:p>
+            <a:pPr marL="552450" marR="0" lvl="0" indent="-342900" algn="l" rtl="0">
+              <a:lnSpc>
+                <a:spcPct val="90000"/>
+              </a:lnSpc>
+              <a:spcBef>
+                <a:spcPts val="600"/>
+              </a:spcBef>
+              <a:spcAft>
+                <a:spcPts val="0"/>
+              </a:spcAft>
+              <a:buClr>
+                <a:schemeClr val="dk1"/>
+              </a:buClr>
+              <a:buSzPts val="2400"/>
+              <a:buFont typeface="Arial" panose="020B0604020202020204" pitchFamily="34" charset="0"/>
+              <a:buChar char="•"/>
+            </a:pPr>
+            <a:r>
+              <a:rPr lang="en-US" sz="2400" dirty="0">
+                <a:solidFill>
+                  <a:schemeClr val="dk1"/>
+                </a:solidFill>
+                <a:latin typeface="Calibri"/>
+                <a:ea typeface="Calibri"/>
+                <a:cs typeface="Calibri"/>
+                <a:sym typeface="Calibri"/>
+              </a:rPr>
+              <a:t>System view controller, Web requests</a:t>
+            </a:r>
+          </a:p>
+          <a:p>
+            <a:pPr marL="552450" marR="0" lvl="0" indent="-342900" algn="l" rtl="0">
+              <a:lnSpc>
+                <a:spcPct val="90000"/>
+              </a:lnSpc>
+              <a:spcBef>
+                <a:spcPts val="600"/>
+              </a:spcBef>
+              <a:spcAft>
+                <a:spcPts val="0"/>
+              </a:spcAft>
+              <a:buClr>
+                <a:schemeClr val="dk1"/>
+              </a:buClr>
+              <a:buSzPts val="2400"/>
+              <a:buFont typeface="Arial" panose="020B0604020202020204" pitchFamily="34" charset="0"/>
+              <a:buChar char="•"/>
+            </a:pPr>
+            <a:r>
+              <a:rPr lang="en-US" sz="2400" dirty="0">
+                <a:solidFill>
+                  <a:schemeClr val="dk1"/>
+                </a:solidFill>
+                <a:latin typeface="Calibri"/>
+                <a:ea typeface="Calibri"/>
+                <a:cs typeface="Calibri"/>
+                <a:sym typeface="Calibri"/>
+              </a:rPr>
+              <a:t>Closures, Extensions</a:t>
+            </a:r>
+          </a:p>
+          <a:p>
+            <a:pPr marL="552450" marR="0" lvl="0" indent="-342900" algn="l" rtl="0">
+              <a:lnSpc>
+                <a:spcPct val="90000"/>
+              </a:lnSpc>
+              <a:spcBef>
+                <a:spcPts val="600"/>
+              </a:spcBef>
+              <a:spcAft>
+                <a:spcPts val="0"/>
+              </a:spcAft>
+              <a:buClr>
+                <a:schemeClr val="dk1"/>
+              </a:buClr>
+              <a:buSzPts val="2400"/>
+              <a:buFont typeface="Arial" panose="020B0604020202020204" pitchFamily="34" charset="0"/>
+              <a:buChar char="•"/>
+            </a:pPr>
+            <a:r>
+              <a:rPr lang="en-US" sz="2400" dirty="0">
+                <a:solidFill>
+                  <a:schemeClr val="dk1"/>
+                </a:solidFill>
+                <a:latin typeface="Calibri"/>
+                <a:ea typeface="Calibri"/>
+                <a:cs typeface="Calibri"/>
+                <a:sym typeface="Calibri"/>
+              </a:rPr>
+              <a:t>App deployment, Swift 5</a:t>
+            </a:r>
+          </a:p>
+          <a:p>
+            <a:pPr marL="552450" marR="0" lvl="0" indent="-342900" algn="l" rtl="0">
+              <a:lnSpc>
+                <a:spcPct val="90000"/>
+              </a:lnSpc>
+              <a:spcBef>
+                <a:spcPts val="600"/>
+              </a:spcBef>
+              <a:spcAft>
+                <a:spcPts val="0"/>
+              </a:spcAft>
+              <a:buClr>
+                <a:schemeClr val="dk1"/>
+              </a:buClr>
+              <a:buSzPts val="2400"/>
+              <a:buFont typeface="Arial" panose="020B0604020202020204" pitchFamily="34" charset="0"/>
+              <a:buChar char="•"/>
+            </a:pPr>
+            <a:endParaRPr lang="en-US" sz="2400" dirty="0">
+              <a:solidFill>
+                <a:schemeClr val="dk1"/>
+              </a:solidFill>
+              <a:latin typeface="Calibri"/>
+              <a:ea typeface="Calibri"/>
+              <a:cs typeface="Calibri"/>
+              <a:sym typeface="Calibri"/>
+            </a:endParaRPr>
+          </a:p>
+          <a:p>
+            <a:pPr marL="552450" marR="0" lvl="0" indent="-342900" algn="l" rtl="0">
+              <a:lnSpc>
+                <a:spcPct val="90000"/>
+              </a:lnSpc>
+              <a:spcBef>
+                <a:spcPts val="600"/>
+              </a:spcBef>
+              <a:spcAft>
+                <a:spcPts val="0"/>
+              </a:spcAft>
+              <a:buClr>
+                <a:schemeClr val="dk1"/>
+              </a:buClr>
+              <a:buSzPts val="2400"/>
+              <a:buFont typeface="Arial" panose="020B0604020202020204" pitchFamily="34" charset="0"/>
+              <a:buChar char="•"/>
+            </a:pPr>
+            <a:endParaRPr lang="en-US" sz="2400" dirty="0">
+              <a:solidFill>
+                <a:schemeClr val="dk1"/>
+              </a:solidFill>
+              <a:latin typeface="Calibri"/>
+              <a:ea typeface="Calibri"/>
+              <a:cs typeface="Calibri"/>
+              <a:sym typeface="Calibri"/>
+            </a:endParaRPr>
+          </a:p>
+          <a:p>
+            <a:pPr marL="552450" marR="0" lvl="0" indent="-342900" algn="l" rtl="0">
+              <a:lnSpc>
+                <a:spcPct val="90000"/>
+              </a:lnSpc>
+              <a:spcBef>
+                <a:spcPts val="600"/>
+              </a:spcBef>
+              <a:spcAft>
+                <a:spcPts val="0"/>
+              </a:spcAft>
+              <a:buClr>
+                <a:schemeClr val="dk1"/>
+              </a:buClr>
+              <a:buSzPts val="2400"/>
+              <a:buFont typeface="Arial" panose="020B0604020202020204" pitchFamily="34" charset="0"/>
+              <a:buChar char="•"/>
+            </a:pPr>
+            <a:endParaRPr sz="2400" b="0" i="0" u="none" strike="noStrike" cap="none" dirty="0">
+              <a:solidFill>
+                <a:schemeClr val="dk1"/>
+              </a:solidFill>
+              <a:latin typeface="Calibri"/>
+              <a:ea typeface="Calibri"/>
+              <a:cs typeface="Calibri"/>
+              <a:sym typeface="Calibri"/>
+            </a:endParaRPr>
+          </a:p>
+        </p:txBody>
+      </p:sp>
+    </p:spTree>
+    <p:extLst>
+      <p:ext uri="{BB962C8B-B14F-4D97-AF65-F5344CB8AC3E}">
+        <p14:creationId xmlns:p14="http://schemas.microsoft.com/office/powerpoint/2010/main" val="3510861473"/>
       </p:ext>
     </p:extLst>
   </p:cSld>

</xml_diff>